<commit_message>
feat: update 1/13/26 slides
</commit_message>
<xml_diff>
--- a/Lab1_UnixForPoets.pptx
+++ b/Lab1_UnixForPoets.pptx
@@ -6,7 +6,7 @@
     <p:sldMasterId id="2147483665" r:id="rId2"/>
   </p:sldMasterIdLst>
   <p:notesMasterIdLst>
-    <p:notesMasterId r:id="rId40"/>
+    <p:notesMasterId r:id="rId41"/>
   </p:notesMasterIdLst>
   <p:sldIdLst>
     <p:sldId id="256" r:id="rId3"/>
@@ -43,9 +43,10 @@
     <p:sldId id="287" r:id="rId34"/>
     <p:sldId id="288" r:id="rId35"/>
     <p:sldId id="289" r:id="rId36"/>
-    <p:sldId id="290" r:id="rId37"/>
-    <p:sldId id="291" r:id="rId38"/>
-    <p:sldId id="292" r:id="rId39"/>
+    <p:sldId id="291" r:id="rId37"/>
+    <p:sldId id="292" r:id="rId38"/>
+    <p:sldId id="293" r:id="rId39"/>
+    <p:sldId id="294" r:id="rId40"/>
   </p:sldIdLst>
   <p:sldSz cx="9144000" cy="5143500" type="screen16x9"/>
   <p:notesSz cx="6845300" cy="9396413"/>
@@ -308,7 +309,7 @@
       </p15:notesGuideLst>
     </p:ext>
     <p:ext uri="GoogleSlidesCustomDataVersion2">
-      <go:slidesCustomData xmlns:go="http://customooxmlschemas.google.com/" xmlns:ahyp="http://schemas.microsoft.com/office/drawing/2018/hyperlinkcolor" xmlns:p15="http://schemas.microsoft.com/office/powerpoint/2012/main" xmlns:p14="http://schemas.microsoft.com/office/powerpoint/2010/main" xmlns:com="http://schemas.openxmlformats.org/drawingml/2006/compatibility" xmlns:pvml="urn:schemas-microsoft-com:office:powerpoint" xmlns:v="urn:schemas-microsoft-com:vml" xmlns:o="urn:schemas-microsoft-com:office:office" xmlns:dgm="http://schemas.openxmlformats.org/drawingml/2006/diagram" xmlns:c="http://schemas.openxmlformats.org/drawingml/2006/chart" xmlns:mv="urn:schemas-microsoft-com:mac:vml" xmlns:mc="http://schemas.openxmlformats.org/markup-compatibility/2006" xmlns="" r:id="rId45" roundtripDataSignature="AMtx7mgiduofKwA0vNhxqNxIM3U6jk6aFA=="/>
+      <go:slidesCustomData xmlns:go="http://customooxmlschemas.google.com/" xmlns:ahyp="http://schemas.microsoft.com/office/drawing/2018/hyperlinkcolor" xmlns:p15="http://schemas.microsoft.com/office/powerpoint/2012/main" xmlns:p14="http://schemas.microsoft.com/office/powerpoint/2010/main" xmlns:com="http://schemas.openxmlformats.org/drawingml/2006/compatibility" xmlns:pvml="urn:schemas-microsoft-com:office:powerpoint" xmlns:v="urn:schemas-microsoft-com:vml" xmlns:o="urn:schemas-microsoft-com:office:office" xmlns:dgm="http://schemas.openxmlformats.org/drawingml/2006/diagram" xmlns:c="http://schemas.openxmlformats.org/drawingml/2006/chart" xmlns:mv="urn:schemas-microsoft-com:mac:vml" xmlns:mc="http://schemas.openxmlformats.org/markup-compatibility/2006" xmlns="" r:id="rId47" roundtripDataSignature="AMtx7miim0KRBLAoT8YMBVLhptaT4boMDQ=="/>
     </p:ext>
   </p:extLst>
 </p:presentation>
@@ -1922,7 +1923,7 @@
   <p:cSld>
     <p:spTree>
       <p:nvGrpSpPr>
-        <p:cNvPr id="1" name="Shape 305"/>
+        <p:cNvPr id="1" name="Shape 306"/>
         <p:cNvGrpSpPr/>
         <p:nvPr/>
       </p:nvGrpSpPr>
@@ -1936,7 +1937,7 @@
       </p:grpSpPr>
       <p:sp>
         <p:nvSpPr>
-          <p:cNvPr id="306" name="Google Shape;306;p11:notes"/>
+          <p:cNvPr id="307" name="Google Shape;307;p11:notes"/>
           <p:cNvSpPr txBox="1">
             <a:spLocks noGrp="1"/>
           </p:cNvSpPr>
@@ -1974,7 +1975,7 @@
       </p:sp>
       <p:sp>
         <p:nvSpPr>
-          <p:cNvPr id="307" name="Google Shape;307;p11:notes"/>
+          <p:cNvPr id="308" name="Google Shape;308;p11:notes"/>
           <p:cNvSpPr>
             <a:spLocks noGrp="1" noRot="1" noChangeAspect="1"/>
           </p:cNvSpPr>
@@ -2026,7 +2027,7 @@
   <p:cSld>
     <p:spTree>
       <p:nvGrpSpPr>
-        <p:cNvPr id="1" name="Shape 312"/>
+        <p:cNvPr id="1" name="Shape 313"/>
         <p:cNvGrpSpPr/>
         <p:nvPr/>
       </p:nvGrpSpPr>
@@ -2040,7 +2041,7 @@
       </p:grpSpPr>
       <p:sp>
         <p:nvSpPr>
-          <p:cNvPr id="313" name="Google Shape;313;p12:notes"/>
+          <p:cNvPr id="314" name="Google Shape;314;p12:notes"/>
           <p:cNvSpPr txBox="1">
             <a:spLocks noGrp="1"/>
           </p:cNvSpPr>
@@ -2078,7 +2079,7 @@
       </p:sp>
       <p:sp>
         <p:nvSpPr>
-          <p:cNvPr id="314" name="Google Shape;314;p12:notes"/>
+          <p:cNvPr id="315" name="Google Shape;315;p12:notes"/>
           <p:cNvSpPr>
             <a:spLocks noGrp="1" noRot="1" noChangeAspect="1"/>
           </p:cNvSpPr>
@@ -2130,7 +2131,7 @@
   <p:cSld>
     <p:spTree>
       <p:nvGrpSpPr>
-        <p:cNvPr id="1" name="Shape 318"/>
+        <p:cNvPr id="1" name="Shape 319"/>
         <p:cNvGrpSpPr/>
         <p:nvPr/>
       </p:nvGrpSpPr>
@@ -2144,7 +2145,7 @@
       </p:grpSpPr>
       <p:sp>
         <p:nvSpPr>
-          <p:cNvPr id="319" name="Google Shape;319;p13:notes"/>
+          <p:cNvPr id="320" name="Google Shape;320;p13:notes"/>
           <p:cNvSpPr txBox="1">
             <a:spLocks noGrp="1"/>
           </p:cNvSpPr>
@@ -2182,7 +2183,7 @@
       </p:sp>
       <p:sp>
         <p:nvSpPr>
-          <p:cNvPr id="320" name="Google Shape;320;p13:notes"/>
+          <p:cNvPr id="321" name="Google Shape;321;p13:notes"/>
           <p:cNvSpPr>
             <a:spLocks noGrp="1" noRot="1" noChangeAspect="1"/>
           </p:cNvSpPr>
@@ -2234,7 +2235,7 @@
   <p:cSld>
     <p:spTree>
       <p:nvGrpSpPr>
-        <p:cNvPr id="1" name="Shape 324"/>
+        <p:cNvPr id="1" name="Shape 325"/>
         <p:cNvGrpSpPr/>
         <p:nvPr/>
       </p:nvGrpSpPr>
@@ -2248,7 +2249,7 @@
       </p:grpSpPr>
       <p:sp>
         <p:nvSpPr>
-          <p:cNvPr id="325" name="Google Shape;325;p14:notes"/>
+          <p:cNvPr id="326" name="Google Shape;326;p14:notes"/>
           <p:cNvSpPr txBox="1">
             <a:spLocks noGrp="1"/>
           </p:cNvSpPr>
@@ -2286,7 +2287,7 @@
       </p:sp>
       <p:sp>
         <p:nvSpPr>
-          <p:cNvPr id="326" name="Google Shape;326;p14:notes"/>
+          <p:cNvPr id="327" name="Google Shape;327;p14:notes"/>
           <p:cNvSpPr>
             <a:spLocks noGrp="1" noRot="1" noChangeAspect="1"/>
           </p:cNvSpPr>
@@ -2338,7 +2339,7 @@
   <p:cSld>
     <p:spTree>
       <p:nvGrpSpPr>
-        <p:cNvPr id="1" name="Shape 330"/>
+        <p:cNvPr id="1" name="Shape 331"/>
         <p:cNvGrpSpPr/>
         <p:nvPr/>
       </p:nvGrpSpPr>
@@ -2352,7 +2353,7 @@
       </p:grpSpPr>
       <p:sp>
         <p:nvSpPr>
-          <p:cNvPr id="331" name="Google Shape;331;p15:notes"/>
+          <p:cNvPr id="332" name="Google Shape;332;p15:notes"/>
           <p:cNvSpPr txBox="1">
             <a:spLocks noGrp="1"/>
           </p:cNvSpPr>
@@ -2390,7 +2391,7 @@
       </p:sp>
       <p:sp>
         <p:nvSpPr>
-          <p:cNvPr id="332" name="Google Shape;332;p15:notes"/>
+          <p:cNvPr id="333" name="Google Shape;333;p15:notes"/>
           <p:cNvSpPr>
             <a:spLocks noGrp="1" noRot="1" noChangeAspect="1"/>
           </p:cNvSpPr>
@@ -2442,7 +2443,7 @@
   <p:cSld>
     <p:spTree>
       <p:nvGrpSpPr>
-        <p:cNvPr id="1" name="Shape 336"/>
+        <p:cNvPr id="1" name="Shape 337"/>
         <p:cNvGrpSpPr/>
         <p:nvPr/>
       </p:nvGrpSpPr>
@@ -2456,7 +2457,7 @@
       </p:grpSpPr>
       <p:sp>
         <p:nvSpPr>
-          <p:cNvPr id="337" name="Google Shape;337;p16:notes"/>
+          <p:cNvPr id="338" name="Google Shape;338;p16:notes"/>
           <p:cNvSpPr txBox="1">
             <a:spLocks noGrp="1"/>
           </p:cNvSpPr>
@@ -2494,7 +2495,7 @@
       </p:sp>
       <p:sp>
         <p:nvSpPr>
-          <p:cNvPr id="338" name="Google Shape;338;p16:notes"/>
+          <p:cNvPr id="339" name="Google Shape;339;p16:notes"/>
           <p:cNvSpPr>
             <a:spLocks noGrp="1" noRot="1" noChangeAspect="1"/>
           </p:cNvSpPr>
@@ -2546,7 +2547,7 @@
   <p:cSld>
     <p:spTree>
       <p:nvGrpSpPr>
-        <p:cNvPr id="1" name="Shape 342"/>
+        <p:cNvPr id="1" name="Shape 343"/>
         <p:cNvGrpSpPr/>
         <p:nvPr/>
       </p:nvGrpSpPr>
@@ -2560,7 +2561,7 @@
       </p:grpSpPr>
       <p:sp>
         <p:nvSpPr>
-          <p:cNvPr id="343" name="Google Shape;343;p17:notes"/>
+          <p:cNvPr id="344" name="Google Shape;344;p17:notes"/>
           <p:cNvSpPr txBox="1">
             <a:spLocks noGrp="1"/>
           </p:cNvSpPr>
@@ -2598,7 +2599,7 @@
       </p:sp>
       <p:sp>
         <p:nvSpPr>
-          <p:cNvPr id="344" name="Google Shape;344;p17:notes"/>
+          <p:cNvPr id="345" name="Google Shape;345;p17:notes"/>
           <p:cNvSpPr>
             <a:spLocks noGrp="1" noRot="1" noChangeAspect="1"/>
           </p:cNvSpPr>
@@ -2650,7 +2651,7 @@
   <p:cSld>
     <p:spTree>
       <p:nvGrpSpPr>
-        <p:cNvPr id="1" name="Shape 348"/>
+        <p:cNvPr id="1" name="Shape 349"/>
         <p:cNvGrpSpPr/>
         <p:nvPr/>
       </p:nvGrpSpPr>
@@ -2664,45 +2665,7 @@
       </p:grpSpPr>
       <p:sp>
         <p:nvSpPr>
-          <p:cNvPr id="349" name="Google Shape;349;p18:notes"/>
-          <p:cNvSpPr txBox="1">
-            <a:spLocks noGrp="1"/>
-          </p:cNvSpPr>
-          <p:nvPr>
-            <p:ph type="body" idx="1"/>
-          </p:nvPr>
-        </p:nvSpPr>
-        <p:spPr>
-          <a:xfrm>
-            <a:off x="912813" y="4464050"/>
-            <a:ext cx="5019675" cy="4227513"/>
-          </a:xfrm>
-          <a:prstGeom prst="rect">
-            <a:avLst/>
-          </a:prstGeom>
-        </p:spPr>
-        <p:txBody>
-          <a:bodyPr spcFirstLastPara="1" wrap="square" lIns="91425" tIns="45700" rIns="91425" bIns="45700" anchor="t" anchorCtr="0">
-            <a:noAutofit/>
-          </a:bodyPr>
-          <a:lstStyle/>
-          <a:p>
-            <a:pPr marL="0" lvl="0" indent="0" algn="l" rtl="0">
-              <a:spcBef>
-                <a:spcPts val="360"/>
-              </a:spcBef>
-              <a:spcAft>
-                <a:spcPts val="0"/>
-              </a:spcAft>
-              <a:buNone/>
-            </a:pPr>
-            <a:endParaRPr/>
-          </a:p>
-        </p:txBody>
-      </p:sp>
-      <p:sp>
-        <p:nvSpPr>
-          <p:cNvPr id="350" name="Google Shape;350;p18:notes"/>
+          <p:cNvPr id="350" name="Google Shape;350;g3b6ba516552_1_0:notes"/>
           <p:cNvSpPr>
             <a:spLocks noGrp="1" noRot="1" noChangeAspect="1"/>
           </p:cNvSpPr>
@@ -2713,7 +2676,7 @@
         <p:spPr>
           <a:xfrm>
             <a:off x="290513" y="704850"/>
-            <a:ext cx="6264275" cy="3524250"/>
+            <a:ext cx="6264300" cy="3524400"/>
           </a:xfrm>
           <a:custGeom>
             <a:avLst/>
@@ -2741,6 +2704,90 @@
           </a:custGeom>
         </p:spPr>
       </p:sp>
+      <p:sp>
+        <p:nvSpPr>
+          <p:cNvPr id="351" name="Google Shape;351;g3b6ba516552_1_0:notes"/>
+          <p:cNvSpPr txBox="1">
+            <a:spLocks noGrp="1"/>
+          </p:cNvSpPr>
+          <p:nvPr>
+            <p:ph type="body" idx="1"/>
+          </p:nvPr>
+        </p:nvSpPr>
+        <p:spPr>
+          <a:xfrm>
+            <a:off x="912813" y="4464050"/>
+            <a:ext cx="5019600" cy="4227600"/>
+          </a:xfrm>
+          <a:prstGeom prst="rect">
+            <a:avLst/>
+          </a:prstGeom>
+        </p:spPr>
+        <p:txBody>
+          <a:bodyPr spcFirstLastPara="1" wrap="square" lIns="91425" tIns="45700" rIns="91425" bIns="45700" anchor="t" anchorCtr="0">
+            <a:noAutofit/>
+          </a:bodyPr>
+          <a:lstStyle/>
+          <a:p>
+            <a:pPr marL="0" lvl="0" indent="0" algn="l" rtl="0">
+              <a:spcBef>
+                <a:spcPts val="360"/>
+              </a:spcBef>
+              <a:spcAft>
+                <a:spcPts val="0"/>
+              </a:spcAft>
+              <a:buNone/>
+            </a:pPr>
+            <a:endParaRPr/>
+          </a:p>
+        </p:txBody>
+      </p:sp>
+      <p:sp>
+        <p:nvSpPr>
+          <p:cNvPr id="352" name="Google Shape;352;g3b6ba516552_1_0:notes"/>
+          <p:cNvSpPr txBox="1">
+            <a:spLocks noGrp="1"/>
+          </p:cNvSpPr>
+          <p:nvPr>
+            <p:ph type="sldNum" idx="12"/>
+          </p:nvPr>
+        </p:nvSpPr>
+        <p:spPr>
+          <a:xfrm>
+            <a:off x="3878263" y="8926513"/>
+            <a:ext cx="2967000" cy="469800"/>
+          </a:xfrm>
+          <a:prstGeom prst="rect">
+            <a:avLst/>
+          </a:prstGeom>
+        </p:spPr>
+        <p:txBody>
+          <a:bodyPr spcFirstLastPara="1" wrap="square" lIns="91425" tIns="45700" rIns="91425" bIns="45700" anchor="b" anchorCtr="0">
+            <a:noAutofit/>
+          </a:bodyPr>
+          <a:lstStyle/>
+          <a:p>
+            <a:pPr marL="0" lvl="0" indent="0" algn="r" rtl="0">
+              <a:spcBef>
+                <a:spcPts val="0"/>
+              </a:spcBef>
+              <a:spcAft>
+                <a:spcPts val="0"/>
+              </a:spcAft>
+              <a:buClr>
+                <a:srgbClr val="000000"/>
+              </a:buClr>
+              <a:buFont typeface="Arial"/>
+              <a:buNone/>
+            </a:pPr>
+            <a:fld id="{00000000-1234-1234-1234-123412341234}" type="slidenum">
+              <a:rPr lang="en-US"/>
+              <a:t>18</a:t>
+            </a:fld>
+            <a:endParaRPr/>
+          </a:p>
+        </p:txBody>
+      </p:sp>
     </p:spTree>
   </p:cSld>
   <p:clrMapOvr>
@@ -2754,7 +2801,7 @@
   <p:cSld>
     <p:spTree>
       <p:nvGrpSpPr>
-        <p:cNvPr id="1" name="Shape 354"/>
+        <p:cNvPr id="1" name="Shape 355"/>
         <p:cNvGrpSpPr/>
         <p:nvPr/>
       </p:nvGrpSpPr>
@@ -2768,7 +2815,7 @@
       </p:grpSpPr>
       <p:sp>
         <p:nvSpPr>
-          <p:cNvPr id="355" name="Google Shape;355;p19:notes"/>
+          <p:cNvPr id="356" name="Google Shape;356;p18:notes"/>
           <p:cNvSpPr txBox="1">
             <a:spLocks noGrp="1"/>
           </p:cNvSpPr>
@@ -2806,7 +2853,7 @@
       </p:sp>
       <p:sp>
         <p:nvSpPr>
-          <p:cNvPr id="356" name="Google Shape;356;p19:notes"/>
+          <p:cNvPr id="357" name="Google Shape;357;p18:notes"/>
           <p:cNvSpPr>
             <a:spLocks noGrp="1" noRot="1" noChangeAspect="1"/>
           </p:cNvSpPr>
@@ -3022,7 +3069,7 @@
   <p:cSld>
     <p:spTree>
       <p:nvGrpSpPr>
-        <p:cNvPr id="1" name="Shape 360"/>
+        <p:cNvPr id="1" name="Shape 361"/>
         <p:cNvGrpSpPr/>
         <p:nvPr/>
       </p:nvGrpSpPr>
@@ -3036,7 +3083,7 @@
       </p:grpSpPr>
       <p:sp>
         <p:nvSpPr>
-          <p:cNvPr id="361" name="Google Shape;361;p20:notes"/>
+          <p:cNvPr id="362" name="Google Shape;362;p19:notes"/>
           <p:cNvSpPr txBox="1">
             <a:spLocks noGrp="1"/>
           </p:cNvSpPr>
@@ -3074,7 +3121,7 @@
       </p:sp>
       <p:sp>
         <p:nvSpPr>
-          <p:cNvPr id="362" name="Google Shape;362;p20:notes"/>
+          <p:cNvPr id="363" name="Google Shape;363;p19:notes"/>
           <p:cNvSpPr>
             <a:spLocks noGrp="1" noRot="1" noChangeAspect="1"/>
           </p:cNvSpPr>
@@ -3126,7 +3173,7 @@
   <p:cSld>
     <p:spTree>
       <p:nvGrpSpPr>
-        <p:cNvPr id="1" name="Shape 366"/>
+        <p:cNvPr id="1" name="Shape 367"/>
         <p:cNvGrpSpPr/>
         <p:nvPr/>
       </p:nvGrpSpPr>
@@ -3140,7 +3187,7 @@
       </p:grpSpPr>
       <p:sp>
         <p:nvSpPr>
-          <p:cNvPr id="367" name="Google Shape;367;p21:notes"/>
+          <p:cNvPr id="368" name="Google Shape;368;p20:notes"/>
           <p:cNvSpPr txBox="1">
             <a:spLocks noGrp="1"/>
           </p:cNvSpPr>
@@ -3178,7 +3225,7 @@
       </p:sp>
       <p:sp>
         <p:nvSpPr>
-          <p:cNvPr id="368" name="Google Shape;368;p21:notes"/>
+          <p:cNvPr id="369" name="Google Shape;369;p20:notes"/>
           <p:cNvSpPr>
             <a:spLocks noGrp="1" noRot="1" noChangeAspect="1"/>
           </p:cNvSpPr>
@@ -3230,7 +3277,7 @@
   <p:cSld>
     <p:spTree>
       <p:nvGrpSpPr>
-        <p:cNvPr id="1" name="Shape 372"/>
+        <p:cNvPr id="1" name="Shape 373"/>
         <p:cNvGrpSpPr/>
         <p:nvPr/>
       </p:nvGrpSpPr>
@@ -3244,7 +3291,7 @@
       </p:grpSpPr>
       <p:sp>
         <p:nvSpPr>
-          <p:cNvPr id="373" name="Google Shape;373;p22:notes"/>
+          <p:cNvPr id="374" name="Google Shape;374;p21:notes"/>
           <p:cNvSpPr txBox="1">
             <a:spLocks noGrp="1"/>
           </p:cNvSpPr>
@@ -3282,7 +3329,7 @@
       </p:sp>
       <p:sp>
         <p:nvSpPr>
-          <p:cNvPr id="374" name="Google Shape;374;p22:notes"/>
+          <p:cNvPr id="375" name="Google Shape;375;p21:notes"/>
           <p:cNvSpPr>
             <a:spLocks noGrp="1" noRot="1" noChangeAspect="1"/>
           </p:cNvSpPr>
@@ -3334,7 +3381,7 @@
   <p:cSld>
     <p:spTree>
       <p:nvGrpSpPr>
-        <p:cNvPr id="1" name="Shape 378"/>
+        <p:cNvPr id="1" name="Shape 379"/>
         <p:cNvGrpSpPr/>
         <p:nvPr/>
       </p:nvGrpSpPr>
@@ -3348,7 +3395,7 @@
       </p:grpSpPr>
       <p:sp>
         <p:nvSpPr>
-          <p:cNvPr id="379" name="Google Shape;379;p23:notes"/>
+          <p:cNvPr id="380" name="Google Shape;380;p22:notes"/>
           <p:cNvSpPr txBox="1">
             <a:spLocks noGrp="1"/>
           </p:cNvSpPr>
@@ -3386,7 +3433,7 @@
       </p:sp>
       <p:sp>
         <p:nvSpPr>
-          <p:cNvPr id="380" name="Google Shape;380;p23:notes"/>
+          <p:cNvPr id="381" name="Google Shape;381;p22:notes"/>
           <p:cNvSpPr>
             <a:spLocks noGrp="1" noRot="1" noChangeAspect="1"/>
           </p:cNvSpPr>
@@ -3438,7 +3485,7 @@
   <p:cSld>
     <p:spTree>
       <p:nvGrpSpPr>
-        <p:cNvPr id="1" name="Shape 384"/>
+        <p:cNvPr id="1" name="Shape 385"/>
         <p:cNvGrpSpPr/>
         <p:nvPr/>
       </p:nvGrpSpPr>
@@ -3452,7 +3499,7 @@
       </p:grpSpPr>
       <p:sp>
         <p:nvSpPr>
-          <p:cNvPr id="385" name="Google Shape;385;p24:notes"/>
+          <p:cNvPr id="386" name="Google Shape;386;p23:notes"/>
           <p:cNvSpPr txBox="1">
             <a:spLocks noGrp="1"/>
           </p:cNvSpPr>
@@ -3490,7 +3537,7 @@
       </p:sp>
       <p:sp>
         <p:nvSpPr>
-          <p:cNvPr id="386" name="Google Shape;386;p24:notes"/>
+          <p:cNvPr id="387" name="Google Shape;387;p23:notes"/>
           <p:cNvSpPr>
             <a:spLocks noGrp="1" noRot="1" noChangeAspect="1"/>
           </p:cNvSpPr>
@@ -3542,7 +3589,7 @@
   <p:cSld>
     <p:spTree>
       <p:nvGrpSpPr>
-        <p:cNvPr id="1" name="Shape 390"/>
+        <p:cNvPr id="1" name="Shape 391"/>
         <p:cNvGrpSpPr/>
         <p:nvPr/>
       </p:nvGrpSpPr>
@@ -3556,7 +3603,7 @@
       </p:grpSpPr>
       <p:sp>
         <p:nvSpPr>
-          <p:cNvPr id="391" name="Google Shape;391;p25:notes"/>
+          <p:cNvPr id="392" name="Google Shape;392;p24:notes"/>
           <p:cNvSpPr txBox="1">
             <a:spLocks noGrp="1"/>
           </p:cNvSpPr>
@@ -3594,7 +3641,7 @@
       </p:sp>
       <p:sp>
         <p:nvSpPr>
-          <p:cNvPr id="392" name="Google Shape;392;p25:notes"/>
+          <p:cNvPr id="393" name="Google Shape;393;p24:notes"/>
           <p:cNvSpPr>
             <a:spLocks noGrp="1" noRot="1" noChangeAspect="1"/>
           </p:cNvSpPr>
@@ -3646,7 +3693,7 @@
   <p:cSld>
     <p:spTree>
       <p:nvGrpSpPr>
-        <p:cNvPr id="1" name="Shape 396"/>
+        <p:cNvPr id="1" name="Shape 397"/>
         <p:cNvGrpSpPr/>
         <p:nvPr/>
       </p:nvGrpSpPr>
@@ -3660,7 +3707,7 @@
       </p:grpSpPr>
       <p:sp>
         <p:nvSpPr>
-          <p:cNvPr id="397" name="Google Shape;397;p26:notes"/>
+          <p:cNvPr id="398" name="Google Shape;398;p25:notes"/>
           <p:cNvSpPr txBox="1">
             <a:spLocks noGrp="1"/>
           </p:cNvSpPr>
@@ -3698,7 +3745,7 @@
       </p:sp>
       <p:sp>
         <p:nvSpPr>
-          <p:cNvPr id="398" name="Google Shape;398;p26:notes"/>
+          <p:cNvPr id="399" name="Google Shape;399;p25:notes"/>
           <p:cNvSpPr>
             <a:spLocks noGrp="1" noRot="1" noChangeAspect="1"/>
           </p:cNvSpPr>
@@ -3750,7 +3797,7 @@
   <p:cSld>
     <p:spTree>
       <p:nvGrpSpPr>
-        <p:cNvPr id="1" name="Shape 402"/>
+        <p:cNvPr id="1" name="Shape 403"/>
         <p:cNvGrpSpPr/>
         <p:nvPr/>
       </p:nvGrpSpPr>
@@ -3764,7 +3811,7 @@
       </p:grpSpPr>
       <p:sp>
         <p:nvSpPr>
-          <p:cNvPr id="403" name="Google Shape;403;p27:notes"/>
+          <p:cNvPr id="404" name="Google Shape;404;p26:notes"/>
           <p:cNvSpPr txBox="1">
             <a:spLocks noGrp="1"/>
           </p:cNvSpPr>
@@ -3802,7 +3849,7 @@
       </p:sp>
       <p:sp>
         <p:nvSpPr>
-          <p:cNvPr id="404" name="Google Shape;404;p27:notes"/>
+          <p:cNvPr id="405" name="Google Shape;405;p26:notes"/>
           <p:cNvSpPr>
             <a:spLocks noGrp="1" noRot="1" noChangeAspect="1"/>
           </p:cNvSpPr>
@@ -3854,7 +3901,7 @@
   <p:cSld>
     <p:spTree>
       <p:nvGrpSpPr>
-        <p:cNvPr id="1" name="Shape 408"/>
+        <p:cNvPr id="1" name="Shape 409"/>
         <p:cNvGrpSpPr/>
         <p:nvPr/>
       </p:nvGrpSpPr>
@@ -3868,7 +3915,7 @@
       </p:grpSpPr>
       <p:sp>
         <p:nvSpPr>
-          <p:cNvPr id="409" name="Google Shape;409;p28:notes"/>
+          <p:cNvPr id="410" name="Google Shape;410;p27:notes"/>
           <p:cNvSpPr txBox="1">
             <a:spLocks noGrp="1"/>
           </p:cNvSpPr>
@@ -3906,7 +3953,7 @@
       </p:sp>
       <p:sp>
         <p:nvSpPr>
-          <p:cNvPr id="410" name="Google Shape;410;p28:notes"/>
+          <p:cNvPr id="411" name="Google Shape;411;p27:notes"/>
           <p:cNvSpPr>
             <a:spLocks noGrp="1" noRot="1" noChangeAspect="1"/>
           </p:cNvSpPr>
@@ -3958,7 +4005,7 @@
   <p:cSld>
     <p:spTree>
       <p:nvGrpSpPr>
-        <p:cNvPr id="1" name="Shape 414"/>
+        <p:cNvPr id="1" name="Shape 415"/>
         <p:cNvGrpSpPr/>
         <p:nvPr/>
       </p:nvGrpSpPr>
@@ -3972,7 +4019,7 @@
       </p:grpSpPr>
       <p:sp>
         <p:nvSpPr>
-          <p:cNvPr id="415" name="Google Shape;415;p29:notes"/>
+          <p:cNvPr id="416" name="Google Shape;416;p28:notes"/>
           <p:cNvSpPr txBox="1">
             <a:spLocks noGrp="1"/>
           </p:cNvSpPr>
@@ -4010,7 +4057,7 @@
       </p:sp>
       <p:sp>
         <p:nvSpPr>
-          <p:cNvPr id="416" name="Google Shape;416;p29:notes"/>
+          <p:cNvPr id="417" name="Google Shape;417;p28:notes"/>
           <p:cNvSpPr>
             <a:spLocks noGrp="1" noRot="1" noChangeAspect="1"/>
           </p:cNvSpPr>
@@ -4166,7 +4213,7 @@
   <p:cSld>
     <p:spTree>
       <p:nvGrpSpPr>
-        <p:cNvPr id="1" name="Shape 420"/>
+        <p:cNvPr id="1" name="Shape 421"/>
         <p:cNvGrpSpPr/>
         <p:nvPr/>
       </p:nvGrpSpPr>
@@ -4180,7 +4227,7 @@
       </p:grpSpPr>
       <p:sp>
         <p:nvSpPr>
-          <p:cNvPr id="421" name="Google Shape;421;g3b2adee5b21_5_12:notes"/>
+          <p:cNvPr id="422" name="Google Shape;422;p29:notes"/>
           <p:cNvSpPr txBox="1">
             <a:spLocks noGrp="1"/>
           </p:cNvSpPr>
@@ -4191,7 +4238,7 @@
         <p:spPr>
           <a:xfrm>
             <a:off x="912813" y="4464050"/>
-            <a:ext cx="5019600" cy="4227600"/>
+            <a:ext cx="5019675" cy="4227513"/>
           </a:xfrm>
           <a:prstGeom prst="rect">
             <a:avLst/>
@@ -4218,7 +4265,7 @@
       </p:sp>
       <p:sp>
         <p:nvSpPr>
-          <p:cNvPr id="422" name="Google Shape;422;g3b2adee5b21_5_12:notes"/>
+          <p:cNvPr id="423" name="Google Shape;423;p29:notes"/>
           <p:cNvSpPr>
             <a:spLocks noGrp="1" noRot="1" noChangeAspect="1"/>
           </p:cNvSpPr>
@@ -4229,7 +4276,7 @@
         <p:spPr>
           <a:xfrm>
             <a:off x="290513" y="704850"/>
-            <a:ext cx="6264300" cy="3524400"/>
+            <a:ext cx="6264275" cy="3524250"/>
           </a:xfrm>
           <a:custGeom>
             <a:avLst/>
@@ -4270,7 +4317,7 @@
   <p:cSld>
     <p:spTree>
       <p:nvGrpSpPr>
-        <p:cNvPr id="1" name="Shape 426"/>
+        <p:cNvPr id="1" name="Shape 427"/>
         <p:cNvGrpSpPr/>
         <p:nvPr/>
       </p:nvGrpSpPr>
@@ -4284,7 +4331,7 @@
       </p:grpSpPr>
       <p:sp>
         <p:nvSpPr>
-          <p:cNvPr id="427" name="Google Shape;427;g3b2adee5b21_3_0:notes"/>
+          <p:cNvPr id="428" name="Google Shape;428;g3b2adee5b21_5_12:notes"/>
           <p:cNvSpPr txBox="1">
             <a:spLocks noGrp="1"/>
           </p:cNvSpPr>
@@ -4322,7 +4369,7 @@
       </p:sp>
       <p:sp>
         <p:nvSpPr>
-          <p:cNvPr id="428" name="Google Shape;428;g3b2adee5b21_3_0:notes"/>
+          <p:cNvPr id="429" name="Google Shape;429;g3b2adee5b21_5_12:notes"/>
           <p:cNvSpPr>
             <a:spLocks noGrp="1" noRot="1" noChangeAspect="1"/>
           </p:cNvSpPr>
@@ -4374,7 +4421,7 @@
   <p:cSld>
     <p:spTree>
       <p:nvGrpSpPr>
-        <p:cNvPr id="1" name="Shape 432"/>
+        <p:cNvPr id="1" name="Shape 433"/>
         <p:cNvGrpSpPr/>
         <p:nvPr/>
       </p:nvGrpSpPr>
@@ -4388,7 +4435,7 @@
       </p:grpSpPr>
       <p:sp>
         <p:nvSpPr>
-          <p:cNvPr id="433" name="Google Shape;433;g3b2adee5b21_5_1:notes"/>
+          <p:cNvPr id="434" name="Google Shape;434;g3b2adee5b21_3_0:notes"/>
           <p:cNvSpPr txBox="1">
             <a:spLocks noGrp="1"/>
           </p:cNvSpPr>
@@ -4426,7 +4473,7 @@
       </p:sp>
       <p:sp>
         <p:nvSpPr>
-          <p:cNvPr id="434" name="Google Shape;434;g3b2adee5b21_5_1:notes"/>
+          <p:cNvPr id="435" name="Google Shape;435;g3b2adee5b21_3_0:notes"/>
           <p:cNvSpPr>
             <a:spLocks noGrp="1" noRot="1" noChangeAspect="1"/>
           </p:cNvSpPr>
@@ -4437,7 +4484,7 @@
         <p:spPr>
           <a:xfrm>
             <a:off x="290513" y="704850"/>
-            <a:ext cx="6264275" cy="3524250"/>
+            <a:ext cx="6264300" cy="3524400"/>
           </a:xfrm>
           <a:custGeom>
             <a:avLst/>
@@ -4478,7 +4525,7 @@
   <p:cSld>
     <p:spTree>
       <p:nvGrpSpPr>
-        <p:cNvPr id="1" name="Shape 441"/>
+        <p:cNvPr id="1" name="Shape 439"/>
         <p:cNvGrpSpPr/>
         <p:nvPr/>
       </p:nvGrpSpPr>
@@ -4492,7 +4539,7 @@
       </p:grpSpPr>
       <p:sp>
         <p:nvSpPr>
-          <p:cNvPr id="442" name="Google Shape;442;g3b2adee5b21_1_8:notes"/>
+          <p:cNvPr id="440" name="Google Shape;440;g3b2adee5b21_5_1:notes"/>
           <p:cNvSpPr txBox="1">
             <a:spLocks noGrp="1"/>
           </p:cNvSpPr>
@@ -4530,7 +4577,7 @@
       </p:sp>
       <p:sp>
         <p:nvSpPr>
-          <p:cNvPr id="443" name="Google Shape;443;g3b2adee5b21_1_8:notes"/>
+          <p:cNvPr id="441" name="Google Shape;441;g3b2adee5b21_5_1:notes"/>
           <p:cNvSpPr>
             <a:spLocks noGrp="1" noRot="1" noChangeAspect="1"/>
           </p:cNvSpPr>
@@ -4541,7 +4588,7 @@
         <p:spPr>
           <a:xfrm>
             <a:off x="290513" y="704850"/>
-            <a:ext cx="6264300" cy="3524400"/>
+            <a:ext cx="6264275" cy="3524250"/>
           </a:xfrm>
           <a:custGeom>
             <a:avLst/>
@@ -4596,7 +4643,7 @@
       </p:grpSpPr>
       <p:sp>
         <p:nvSpPr>
-          <p:cNvPr id="449" name="Google Shape;449;p30:notes"/>
+          <p:cNvPr id="449" name="Google Shape;449;g3b2adee5b21_1_8:notes"/>
           <p:cNvSpPr txBox="1">
             <a:spLocks noGrp="1"/>
           </p:cNvSpPr>
@@ -4607,7 +4654,7 @@
         <p:spPr>
           <a:xfrm>
             <a:off x="912813" y="4464050"/>
-            <a:ext cx="5019675" cy="4227513"/>
+            <a:ext cx="5019600" cy="4227600"/>
           </a:xfrm>
           <a:prstGeom prst="rect">
             <a:avLst/>
@@ -4634,7 +4681,7 @@
       </p:sp>
       <p:sp>
         <p:nvSpPr>
-          <p:cNvPr id="450" name="Google Shape;450;p30:notes"/>
+          <p:cNvPr id="450" name="Google Shape;450;g3b2adee5b21_1_8:notes"/>
           <p:cNvSpPr>
             <a:spLocks noGrp="1" noRot="1" noChangeAspect="1"/>
           </p:cNvSpPr>
@@ -4645,7 +4692,7 @@
         <p:spPr>
           <a:xfrm>
             <a:off x="290513" y="704850"/>
-            <a:ext cx="6264275" cy="3524250"/>
+            <a:ext cx="6264300" cy="3524400"/>
           </a:xfrm>
           <a:custGeom>
             <a:avLst/>
@@ -4686,7 +4733,7 @@
   <p:cSld>
     <p:spTree>
       <p:nvGrpSpPr>
-        <p:cNvPr id="1" name="Shape 454"/>
+        <p:cNvPr id="1" name="Shape 465"/>
         <p:cNvGrpSpPr/>
         <p:nvPr/>
       </p:nvGrpSpPr>
@@ -4700,7 +4747,7 @@
       </p:grpSpPr>
       <p:sp>
         <p:nvSpPr>
-          <p:cNvPr id="455" name="Google Shape;455;p31:notes"/>
+          <p:cNvPr id="466" name="Google Shape;466;p30:notes"/>
           <p:cNvSpPr txBox="1">
             <a:spLocks noGrp="1"/>
           </p:cNvSpPr>
@@ -4738,7 +4785,7 @@
       </p:sp>
       <p:sp>
         <p:nvSpPr>
-          <p:cNvPr id="456" name="Google Shape;456;p31:notes"/>
+          <p:cNvPr id="467" name="Google Shape;467;p30:notes"/>
           <p:cNvSpPr>
             <a:spLocks noGrp="1" noRot="1" noChangeAspect="1"/>
           </p:cNvSpPr>
@@ -4790,7 +4837,7 @@
   <p:cSld>
     <p:spTree>
       <p:nvGrpSpPr>
-        <p:cNvPr id="1" name="Shape 460"/>
+        <p:cNvPr id="1" name="Shape 471"/>
         <p:cNvGrpSpPr/>
         <p:nvPr/>
       </p:nvGrpSpPr>
@@ -4804,7 +4851,7 @@
       </p:grpSpPr>
       <p:sp>
         <p:nvSpPr>
-          <p:cNvPr id="461" name="Google Shape;461;p32:notes"/>
+          <p:cNvPr id="472" name="Google Shape;472;p31:notes"/>
           <p:cNvSpPr txBox="1">
             <a:spLocks noGrp="1"/>
           </p:cNvSpPr>
@@ -4842,7 +4889,7 @@
       </p:sp>
       <p:sp>
         <p:nvSpPr>
-          <p:cNvPr id="462" name="Google Shape;462;p32:notes"/>
+          <p:cNvPr id="473" name="Google Shape;473;p31:notes"/>
           <p:cNvSpPr>
             <a:spLocks noGrp="1" noRot="1" noChangeAspect="1"/>
           </p:cNvSpPr>
@@ -4894,7 +4941,7 @@
   <p:cSld>
     <p:spTree>
       <p:nvGrpSpPr>
-        <p:cNvPr id="1" name="Shape 466"/>
+        <p:cNvPr id="1" name="Shape 477"/>
         <p:cNvGrpSpPr/>
         <p:nvPr/>
       </p:nvGrpSpPr>
@@ -4908,7 +4955,7 @@
       </p:grpSpPr>
       <p:sp>
         <p:nvSpPr>
-          <p:cNvPr id="467" name="Google Shape;467;p33:notes"/>
+          <p:cNvPr id="478" name="Google Shape;478;p32:notes"/>
           <p:cNvSpPr txBox="1">
             <a:spLocks noGrp="1"/>
           </p:cNvSpPr>
@@ -4946,7 +4993,111 @@
       </p:sp>
       <p:sp>
         <p:nvSpPr>
-          <p:cNvPr id="468" name="Google Shape;468;p33:notes"/>
+          <p:cNvPr id="479" name="Google Shape;479;p32:notes"/>
+          <p:cNvSpPr>
+            <a:spLocks noGrp="1" noRot="1" noChangeAspect="1"/>
+          </p:cNvSpPr>
+          <p:nvPr>
+            <p:ph type="sldImg" idx="2"/>
+          </p:nvPr>
+        </p:nvSpPr>
+        <p:spPr>
+          <a:xfrm>
+            <a:off x="290513" y="704850"/>
+            <a:ext cx="6264275" cy="3524250"/>
+          </a:xfrm>
+          <a:custGeom>
+            <a:avLst/>
+            <a:gdLst/>
+            <a:ahLst/>
+            <a:cxnLst/>
+            <a:rect l="l" t="t" r="r" b="b"/>
+            <a:pathLst>
+              <a:path w="120000" h="120000" extrusionOk="0">
+                <a:moveTo>
+                  <a:pt x="0" y="0"/>
+                </a:moveTo>
+                <a:lnTo>
+                  <a:pt x="120000" y="0"/>
+                </a:lnTo>
+                <a:lnTo>
+                  <a:pt x="120000" y="120000"/>
+                </a:lnTo>
+                <a:lnTo>
+                  <a:pt x="0" y="120000"/>
+                </a:lnTo>
+                <a:close/>
+              </a:path>
+            </a:pathLst>
+          </a:custGeom>
+        </p:spPr>
+      </p:sp>
+    </p:spTree>
+  </p:cSld>
+  <p:clrMapOvr>
+    <a:masterClrMapping/>
+  </p:clrMapOvr>
+</p:notes>
+</file>
+
+<file path=ppt/notesSlides/notesSlide38.xml><?xml version="1.0" encoding="utf-8"?>
+<p:notes xmlns:a="http://schemas.openxmlformats.org/drawingml/2006/main" xmlns:r="http://schemas.openxmlformats.org/officeDocument/2006/relationships" xmlns:p="http://schemas.openxmlformats.org/presentationml/2006/main" showMasterSp="0" showMasterPhAnim="0">
+  <p:cSld>
+    <p:spTree>
+      <p:nvGrpSpPr>
+        <p:cNvPr id="1" name="Shape 483"/>
+        <p:cNvGrpSpPr/>
+        <p:nvPr/>
+      </p:nvGrpSpPr>
+      <p:grpSpPr>
+        <a:xfrm>
+          <a:off x="0" y="0"/>
+          <a:ext cx="0" cy="0"/>
+          <a:chOff x="0" y="0"/>
+          <a:chExt cx="0" cy="0"/>
+        </a:xfrm>
+      </p:grpSpPr>
+      <p:sp>
+        <p:nvSpPr>
+          <p:cNvPr id="484" name="Google Shape;484;p33:notes"/>
+          <p:cNvSpPr txBox="1">
+            <a:spLocks noGrp="1"/>
+          </p:cNvSpPr>
+          <p:nvPr>
+            <p:ph type="body" idx="1"/>
+          </p:nvPr>
+        </p:nvSpPr>
+        <p:spPr>
+          <a:xfrm>
+            <a:off x="912813" y="4464050"/>
+            <a:ext cx="5019675" cy="4227513"/>
+          </a:xfrm>
+          <a:prstGeom prst="rect">
+            <a:avLst/>
+          </a:prstGeom>
+        </p:spPr>
+        <p:txBody>
+          <a:bodyPr spcFirstLastPara="1" wrap="square" lIns="91425" tIns="45700" rIns="91425" bIns="45700" anchor="t" anchorCtr="0">
+            <a:noAutofit/>
+          </a:bodyPr>
+          <a:lstStyle/>
+          <a:p>
+            <a:pPr marL="0" lvl="0" indent="0" algn="l" rtl="0">
+              <a:spcBef>
+                <a:spcPts val="360"/>
+              </a:spcBef>
+              <a:spcAft>
+                <a:spcPts val="0"/>
+              </a:spcAft>
+              <a:buNone/>
+            </a:pPr>
+            <a:endParaRPr/>
+          </a:p>
+        </p:txBody>
+      </p:sp>
+      <p:sp>
+        <p:nvSpPr>
+          <p:cNvPr id="485" name="Google Shape;485;p33:notes"/>
           <p:cNvSpPr>
             <a:spLocks noGrp="1" noRot="1" noChangeAspect="1"/>
           </p:cNvSpPr>
@@ -36132,7 +36283,7 @@
         </p:nvSpPr>
         <p:spPr>
           <a:xfrm>
-            <a:off x="3605400" y="2715125"/>
+            <a:off x="3605400" y="2004050"/>
             <a:ext cx="5233800" cy="1562400"/>
           </a:xfrm>
           <a:prstGeom prst="rect">
@@ -36262,6 +36413,64 @@
           </a:p>
         </p:txBody>
       </p:sp>
+      <p:sp>
+        <p:nvSpPr>
+          <p:cNvPr id="305" name="Google Shape;305;p10"/>
+          <p:cNvSpPr txBox="1"/>
+          <p:nvPr/>
+        </p:nvSpPr>
+        <p:spPr>
+          <a:xfrm>
+            <a:off x="4365325" y="3780975"/>
+            <a:ext cx="4206300" cy="1112400"/>
+          </a:xfrm>
+          <a:prstGeom prst="rect">
+            <a:avLst/>
+          </a:prstGeom>
+          <a:noFill/>
+          <a:ln>
+            <a:noFill/>
+          </a:ln>
+        </p:spPr>
+        <p:txBody>
+          <a:bodyPr spcFirstLastPara="1" wrap="square" lIns="91425" tIns="91425" rIns="91425" bIns="91425" anchor="t" anchorCtr="0">
+            <a:noAutofit/>
+          </a:bodyPr>
+          <a:lstStyle/>
+          <a:p>
+            <a:pPr marL="0" lvl="0" indent="0" algn="l" rtl="0">
+              <a:spcBef>
+                <a:spcPts val="0"/>
+              </a:spcBef>
+              <a:spcAft>
+                <a:spcPts val="0"/>
+              </a:spcAft>
+              <a:buNone/>
+            </a:pPr>
+            <a:r>
+              <a:rPr lang="en-US" sz="1800">
+                <a:solidFill>
+                  <a:schemeClr val="dk1"/>
+                </a:solidFill>
+                <a:latin typeface="Calibri"/>
+                <a:ea typeface="Calibri"/>
+                <a:cs typeface="Calibri"/>
+                <a:sym typeface="Calibri"/>
+              </a:rPr>
+              <a:t>Note that you may get a slightly different sort because sort doesn't use ASCII order (uppercase before lowercase) in some versions of Unix.</a:t>
+            </a:r>
+            <a:endParaRPr sz="1800">
+              <a:solidFill>
+                <a:schemeClr val="dk1"/>
+              </a:solidFill>
+              <a:latin typeface="Calibri"/>
+              <a:ea typeface="Calibri"/>
+              <a:cs typeface="Calibri"/>
+              <a:sym typeface="Calibri"/>
+            </a:endParaRPr>
+          </a:p>
+        </p:txBody>
+      </p:sp>
     </p:spTree>
   </p:cSld>
   <p:clrMapOvr>
@@ -36275,7 +36484,7 @@
   <p:cSld>
     <p:spTree>
       <p:nvGrpSpPr>
-        <p:cNvPr id="1" name="Shape 308"/>
+        <p:cNvPr id="1" name="Shape 309"/>
         <p:cNvGrpSpPr/>
         <p:nvPr/>
       </p:nvGrpSpPr>
@@ -36289,7 +36498,7 @@
       </p:grpSpPr>
       <p:sp>
         <p:nvSpPr>
-          <p:cNvPr id="309" name="Google Shape;309;p11"/>
+          <p:cNvPr id="310" name="Google Shape;310;p11"/>
           <p:cNvSpPr txBox="1">
             <a:spLocks noGrp="1"/>
           </p:cNvSpPr>
@@ -36335,7 +36544,7 @@
       </p:sp>
       <p:sp>
         <p:nvSpPr>
-          <p:cNvPr id="310" name="Google Shape;310;p11"/>
+          <p:cNvPr id="311" name="Google Shape;311;p11"/>
           <p:cNvSpPr txBox="1">
             <a:spLocks noGrp="1"/>
           </p:cNvSpPr>
@@ -36515,7 +36724,7 @@
       </p:sp>
       <p:sp>
         <p:nvSpPr>
-          <p:cNvPr id="311" name="Google Shape;311;p11"/>
+          <p:cNvPr id="312" name="Google Shape;312;p11"/>
           <p:cNvSpPr txBox="1">
             <a:spLocks noGrp="1"/>
           </p:cNvSpPr>
@@ -36652,7 +36861,7 @@
   <p:cSld>
     <p:spTree>
       <p:nvGrpSpPr>
-        <p:cNvPr id="1" name="Shape 315"/>
+        <p:cNvPr id="1" name="Shape 316"/>
         <p:cNvGrpSpPr/>
         <p:nvPr/>
       </p:nvGrpSpPr>
@@ -36666,7 +36875,7 @@
       </p:grpSpPr>
       <p:sp>
         <p:nvSpPr>
-          <p:cNvPr id="316" name="Google Shape;316;p12"/>
+          <p:cNvPr id="317" name="Google Shape;317;p12"/>
           <p:cNvSpPr txBox="1">
             <a:spLocks noGrp="1"/>
           </p:cNvSpPr>
@@ -36720,7 +36929,7 @@
       </p:sp>
       <p:sp>
         <p:nvSpPr>
-          <p:cNvPr id="317" name="Google Shape;317;p12"/>
+          <p:cNvPr id="318" name="Google Shape;318;p12"/>
           <p:cNvSpPr txBox="1">
             <a:spLocks noGrp="1"/>
           </p:cNvSpPr>
@@ -36802,7 +37011,7 @@
   <p:cSld>
     <p:spTree>
       <p:nvGrpSpPr>
-        <p:cNvPr id="1" name="Shape 321"/>
+        <p:cNvPr id="1" name="Shape 322"/>
         <p:cNvGrpSpPr/>
         <p:nvPr/>
       </p:nvGrpSpPr>
@@ -36816,7 +37025,7 @@
       </p:grpSpPr>
       <p:sp>
         <p:nvSpPr>
-          <p:cNvPr id="322" name="Google Shape;322;p13"/>
+          <p:cNvPr id="323" name="Google Shape;323;p13"/>
           <p:cNvSpPr txBox="1">
             <a:spLocks noGrp="1"/>
           </p:cNvSpPr>
@@ -36870,7 +37079,7 @@
       </p:sp>
       <p:sp>
         <p:nvSpPr>
-          <p:cNvPr id="323" name="Google Shape;323;p13"/>
+          <p:cNvPr id="324" name="Google Shape;324;p13"/>
           <p:cNvSpPr txBox="1">
             <a:spLocks noGrp="1"/>
           </p:cNvSpPr>
@@ -37108,7 +37317,7 @@
   <p:cSld>
     <p:spTree>
       <p:nvGrpSpPr>
-        <p:cNvPr id="1" name="Shape 327"/>
+        <p:cNvPr id="1" name="Shape 328"/>
         <p:cNvGrpSpPr/>
         <p:nvPr/>
       </p:nvGrpSpPr>
@@ -37122,7 +37331,7 @@
       </p:grpSpPr>
       <p:sp>
         <p:nvSpPr>
-          <p:cNvPr id="328" name="Google Shape;328;p14"/>
+          <p:cNvPr id="329" name="Google Shape;329;p14"/>
           <p:cNvSpPr txBox="1">
             <a:spLocks noGrp="1"/>
           </p:cNvSpPr>
@@ -37168,7 +37377,7 @@
       </p:sp>
       <p:sp>
         <p:nvSpPr>
-          <p:cNvPr id="329" name="Google Shape;329;p14"/>
+          <p:cNvPr id="330" name="Google Shape;330;p14"/>
           <p:cNvSpPr txBox="1">
             <a:spLocks noGrp="1"/>
           </p:cNvSpPr>
@@ -37403,7 +37612,7 @@
   <p:cSld>
     <p:spTree>
       <p:nvGrpSpPr>
-        <p:cNvPr id="1" name="Shape 333"/>
+        <p:cNvPr id="1" name="Shape 334"/>
         <p:cNvGrpSpPr/>
         <p:nvPr/>
       </p:nvGrpSpPr>
@@ -37417,7 +37626,7 @@
       </p:grpSpPr>
       <p:sp>
         <p:nvSpPr>
-          <p:cNvPr id="334" name="Google Shape;334;p15"/>
+          <p:cNvPr id="335" name="Google Shape;335;p15"/>
           <p:cNvSpPr txBox="1">
             <a:spLocks noGrp="1"/>
           </p:cNvSpPr>
@@ -37471,7 +37680,7 @@
       </p:sp>
       <p:sp>
         <p:nvSpPr>
-          <p:cNvPr id="335" name="Google Shape;335;p15"/>
+          <p:cNvPr id="336" name="Google Shape;336;p15"/>
           <p:cNvSpPr txBox="1">
             <a:spLocks noGrp="1"/>
           </p:cNvSpPr>
@@ -37552,7 +37761,7 @@
   <p:cSld>
     <p:spTree>
       <p:nvGrpSpPr>
-        <p:cNvPr id="1" name="Shape 339"/>
+        <p:cNvPr id="1" name="Shape 340"/>
         <p:cNvGrpSpPr/>
         <p:nvPr/>
       </p:nvGrpSpPr>
@@ -37566,7 +37775,7 @@
       </p:grpSpPr>
       <p:sp>
         <p:nvSpPr>
-          <p:cNvPr id="340" name="Google Shape;340;p16"/>
+          <p:cNvPr id="341" name="Google Shape;341;p16"/>
           <p:cNvSpPr txBox="1">
             <a:spLocks noGrp="1"/>
           </p:cNvSpPr>
@@ -37620,7 +37829,7 @@
       </p:sp>
       <p:sp>
         <p:nvSpPr>
-          <p:cNvPr id="341" name="Google Shape;341;p16"/>
+          <p:cNvPr id="342" name="Google Shape;342;p16"/>
           <p:cNvSpPr txBox="1">
             <a:spLocks noGrp="1"/>
           </p:cNvSpPr>
@@ -37937,7 +38146,7 @@
   <p:cSld>
     <p:spTree>
       <p:nvGrpSpPr>
-        <p:cNvPr id="1" name="Shape 345"/>
+        <p:cNvPr id="1" name="Shape 346"/>
         <p:cNvGrpSpPr/>
         <p:nvPr/>
       </p:nvGrpSpPr>
@@ -37951,7 +38160,7 @@
       </p:grpSpPr>
       <p:sp>
         <p:nvSpPr>
-          <p:cNvPr id="346" name="Google Shape;346;p17"/>
+          <p:cNvPr id="347" name="Google Shape;347;p17"/>
           <p:cNvSpPr txBox="1">
             <a:spLocks noGrp="1"/>
           </p:cNvSpPr>
@@ -38005,7 +38214,7 @@
       </p:sp>
       <p:sp>
         <p:nvSpPr>
-          <p:cNvPr id="347" name="Google Shape;347;p17"/>
+          <p:cNvPr id="348" name="Google Shape;348;p17"/>
           <p:cNvSpPr txBox="1">
             <a:spLocks noGrp="1"/>
           </p:cNvSpPr>
@@ -38216,7 +38425,7 @@
   <p:cSld>
     <p:spTree>
       <p:nvGrpSpPr>
-        <p:cNvPr id="1" name="Shape 351"/>
+        <p:cNvPr id="1" name="Shape 353"/>
         <p:cNvGrpSpPr/>
         <p:nvPr/>
       </p:nvGrpSpPr>
@@ -38230,7 +38439,137 @@
       </p:grpSpPr>
       <p:sp>
         <p:nvSpPr>
-          <p:cNvPr id="352" name="Google Shape;352;p18"/>
+          <p:cNvPr id="354" name="Google Shape;354;g3b6ba516552_1_0"/>
+          <p:cNvSpPr txBox="1">
+            <a:spLocks noGrp="1"/>
+          </p:cNvSpPr>
+          <p:nvPr>
+            <p:ph type="body" idx="1"/>
+          </p:nvPr>
+        </p:nvSpPr>
+        <p:spPr>
+          <a:xfrm>
+            <a:off x="822960" y="1200150"/>
+            <a:ext cx="7543800" cy="3429000"/>
+          </a:xfrm>
+          <a:prstGeom prst="rect">
+            <a:avLst/>
+          </a:prstGeom>
+        </p:spPr>
+        <p:txBody>
+          <a:bodyPr spcFirstLastPara="1" wrap="square" lIns="0" tIns="45700" rIns="0" bIns="45700" anchor="t" anchorCtr="0">
+            <a:normAutofit/>
+          </a:bodyPr>
+          <a:lstStyle/>
+          <a:p>
+            <a:pPr marL="0" lvl="0" indent="0" algn="l" rtl="0">
+              <a:lnSpc>
+                <a:spcPct val="100000"/>
+              </a:lnSpc>
+              <a:spcBef>
+                <a:spcPts val="0"/>
+              </a:spcBef>
+              <a:spcAft>
+                <a:spcPts val="0"/>
+              </a:spcAft>
+              <a:buNone/>
+            </a:pPr>
+            <a:r>
+              <a:rPr lang="en-US" sz="2200">
+                <a:solidFill>
+                  <a:schemeClr val="dk1"/>
+                </a:solidFill>
+              </a:rPr>
+              <a:t>First, let’s save our previous work (where each word in the article takes a new line) into a file called `nyt.words`:</a:t>
+            </a:r>
+            <a:endParaRPr sz="2200">
+              <a:solidFill>
+                <a:schemeClr val="dk1"/>
+              </a:solidFill>
+            </a:endParaRPr>
+          </a:p>
+          <a:p>
+            <a:pPr marL="342900" lvl="0" indent="-330200" algn="l" rtl="0">
+              <a:lnSpc>
+                <a:spcPct val="100000"/>
+              </a:lnSpc>
+              <a:spcBef>
+                <a:spcPts val="0"/>
+              </a:spcBef>
+              <a:spcAft>
+                <a:spcPts val="0"/>
+              </a:spcAft>
+              <a:buClr>
+                <a:srgbClr val="CC0000"/>
+              </a:buClr>
+              <a:buSzPts val="2200"/>
+              <a:buFont typeface="Times"/>
+              <a:buChar char="•"/>
+            </a:pPr>
+            <a:r>
+              <a:rPr lang="en-US" sz="2200">
+                <a:solidFill>
+                  <a:schemeClr val="dk1"/>
+                </a:solidFill>
+                <a:latin typeface="Courier"/>
+                <a:ea typeface="Courier"/>
+                <a:cs typeface="Courier"/>
+                <a:sym typeface="Courier"/>
+              </a:rPr>
+              <a:t>tr -sc 'A-Za-z' '\n' &lt; nyt_200811.txt &gt; nyt.words</a:t>
+            </a:r>
+            <a:endParaRPr sz="2200">
+              <a:solidFill>
+                <a:schemeClr val="dk1"/>
+              </a:solidFill>
+              <a:latin typeface="Courier"/>
+              <a:ea typeface="Courier"/>
+              <a:cs typeface="Courier"/>
+              <a:sym typeface="Courier"/>
+            </a:endParaRPr>
+          </a:p>
+          <a:p>
+            <a:pPr marL="0" lvl="0" indent="0" algn="l" rtl="0">
+              <a:spcBef>
+                <a:spcPts val="900"/>
+              </a:spcBef>
+              <a:spcAft>
+                <a:spcPts val="150"/>
+              </a:spcAft>
+              <a:buNone/>
+            </a:pPr>
+            <a:endParaRPr/>
+          </a:p>
+        </p:txBody>
+      </p:sp>
+    </p:spTree>
+  </p:cSld>
+  <p:clrMapOvr>
+    <a:masterClrMapping/>
+  </p:clrMapOvr>
+</p:sld>
+</file>
+
+<file path=ppt/slides/slide19.xml><?xml version="1.0" encoding="utf-8"?>
+<p:sld xmlns:a="http://schemas.openxmlformats.org/drawingml/2006/main" xmlns:r="http://schemas.openxmlformats.org/officeDocument/2006/relationships" xmlns:p="http://schemas.openxmlformats.org/presentationml/2006/main">
+  <p:cSld>
+    <p:spTree>
+      <p:nvGrpSpPr>
+        <p:cNvPr id="1" name="Shape 358"/>
+        <p:cNvGrpSpPr/>
+        <p:nvPr/>
+      </p:nvGrpSpPr>
+      <p:grpSpPr>
+        <a:xfrm>
+          <a:off x="0" y="0"/>
+          <a:ext cx="0" cy="0"/>
+          <a:chOff x="0" y="0"/>
+          <a:chExt cx="0" cy="0"/>
+        </a:xfrm>
+      </p:grpSpPr>
+      <p:sp>
+        <p:nvSpPr>
+          <p:cNvPr id="359" name="Google Shape;359;p18"/>
           <p:cNvSpPr txBox="1">
             <a:spLocks noGrp="1"/>
           </p:cNvSpPr>
@@ -38284,7 +38623,7 @@
       </p:sp>
       <p:sp>
         <p:nvSpPr>
-          <p:cNvPr id="353" name="Google Shape;353;p18"/>
+          <p:cNvPr id="360" name="Google Shape;360;p18"/>
           <p:cNvSpPr txBox="1">
             <a:spLocks noGrp="1"/>
           </p:cNvSpPr>
@@ -38307,7 +38646,7 @@
         </p:spPr>
         <p:txBody>
           <a:bodyPr spcFirstLastPara="1" wrap="square" lIns="0" tIns="45700" rIns="0" bIns="45700" anchor="t" anchorCtr="0">
-            <a:normAutofit/>
+            <a:normAutofit lnSpcReduction="10000"/>
           </a:bodyPr>
           <a:lstStyle/>
           <a:p>
@@ -38471,7 +38810,7 @@
                 <a:cs typeface="Courier"/>
                 <a:sym typeface="Courier"/>
               </a:rPr>
-              <a:t>grep 'ing$' nyt.words |sort | uniq –c</a:t>
+              <a:t>grep 'ing$' nyt.words |sort | uniq -c</a:t>
             </a:r>
             <a:endParaRPr/>
           </a:p>
@@ -38489,251 +38828,6 @@
               <a:buSzPts val="2800"/>
               <a:buNone/>
             </a:pPr>
-            <a:endParaRPr/>
-          </a:p>
-        </p:txBody>
-      </p:sp>
-    </p:spTree>
-  </p:cSld>
-  <p:clrMapOvr>
-    <a:masterClrMapping/>
-  </p:clrMapOvr>
-</p:sld>
-</file>
-
-<file path=ppt/slides/slide19.xml><?xml version="1.0" encoding="utf-8"?>
-<p:sld xmlns:a="http://schemas.openxmlformats.org/drawingml/2006/main" xmlns:r="http://schemas.openxmlformats.org/officeDocument/2006/relationships" xmlns:p="http://schemas.openxmlformats.org/presentationml/2006/main">
-  <p:cSld>
-    <p:spTree>
-      <p:nvGrpSpPr>
-        <p:cNvPr id="1" name="Shape 357"/>
-        <p:cNvGrpSpPr/>
-        <p:nvPr/>
-      </p:nvGrpSpPr>
-      <p:grpSpPr>
-        <a:xfrm>
-          <a:off x="0" y="0"/>
-          <a:ext cx="0" cy="0"/>
-          <a:chOff x="0" y="0"/>
-          <a:chExt cx="0" cy="0"/>
-        </a:xfrm>
-      </p:grpSpPr>
-      <p:sp>
-        <p:nvSpPr>
-          <p:cNvPr id="358" name="Google Shape;358;p19"/>
-          <p:cNvSpPr txBox="1">
-            <a:spLocks noGrp="1"/>
-          </p:cNvSpPr>
-          <p:nvPr>
-            <p:ph type="title"/>
-          </p:nvPr>
-        </p:nvSpPr>
-        <p:spPr>
-          <a:xfrm>
-            <a:off x="822960" y="119702"/>
-            <a:ext cx="7543800" cy="680397"/>
-          </a:xfrm>
-          <a:prstGeom prst="rect">
-            <a:avLst/>
-          </a:prstGeom>
-          <a:noFill/>
-          <a:ln>
-            <a:noFill/>
-          </a:ln>
-        </p:spPr>
-        <p:txBody>
-          <a:bodyPr spcFirstLastPara="1" wrap="square" lIns="91425" tIns="45700" rIns="91425" bIns="45700" anchor="b" anchorCtr="0">
-            <a:normAutofit/>
-          </a:bodyPr>
-          <a:lstStyle/>
-          <a:p>
-            <a:pPr marL="0" lvl="0" indent="0" algn="l" rtl="0">
-              <a:lnSpc>
-                <a:spcPct val="85000"/>
-              </a:lnSpc>
-              <a:spcBef>
-                <a:spcPts val="0"/>
-              </a:spcBef>
-              <a:spcAft>
-                <a:spcPts val="0"/>
-              </a:spcAft>
-              <a:buClr>
-                <a:srgbClr val="3F3F3F"/>
-              </a:buClr>
-              <a:buSzPts val="3600"/>
-              <a:buFont typeface="Calibri"/>
-              <a:buNone/>
-            </a:pPr>
-            <a:r>
-              <a:rPr lang="en-US"/>
-              <a:t>grep</a:t>
-            </a:r>
-            <a:endParaRPr/>
-          </a:p>
-        </p:txBody>
-      </p:sp>
-      <p:sp>
-        <p:nvSpPr>
-          <p:cNvPr id="359" name="Google Shape;359;p19"/>
-          <p:cNvSpPr txBox="1">
-            <a:spLocks noGrp="1"/>
-          </p:cNvSpPr>
-          <p:nvPr>
-            <p:ph type="body" idx="1"/>
-          </p:nvPr>
-        </p:nvSpPr>
-        <p:spPr>
-          <a:xfrm>
-            <a:off x="457200" y="1200150"/>
-            <a:ext cx="8534400" cy="3790950"/>
-          </a:xfrm>
-          <a:prstGeom prst="rect">
-            <a:avLst/>
-          </a:prstGeom>
-          <a:noFill/>
-          <a:ln>
-            <a:noFill/>
-          </a:ln>
-        </p:spPr>
-        <p:txBody>
-          <a:bodyPr spcFirstLastPara="1" wrap="square" lIns="0" tIns="45700" rIns="0" bIns="45700" anchor="t" anchorCtr="0">
-            <a:normAutofit/>
-          </a:bodyPr>
-          <a:lstStyle/>
-          <a:p>
-            <a:pPr marL="7938" lvl="0" indent="-7938" algn="l" rtl="0">
-              <a:lnSpc>
-                <a:spcPct val="90000"/>
-              </a:lnSpc>
-              <a:spcBef>
-                <a:spcPts val="0"/>
-              </a:spcBef>
-              <a:spcAft>
-                <a:spcPts val="0"/>
-              </a:spcAft>
-              <a:buSzPts val="2800"/>
-              <a:buNone/>
-            </a:pPr>
-            <a:r>
-              <a:rPr lang="en-US"/>
-              <a:t>grep is a filter – you keep only some lines of the input</a:t>
-            </a:r>
-            <a:endParaRPr/>
-          </a:p>
-          <a:p>
-            <a:pPr marL="7938" lvl="0" indent="-7938" algn="l" rtl="0">
-              <a:lnSpc>
-                <a:spcPct val="90000"/>
-              </a:lnSpc>
-              <a:spcBef>
-                <a:spcPts val="1050"/>
-              </a:spcBef>
-              <a:spcAft>
-                <a:spcPts val="0"/>
-              </a:spcAft>
-              <a:buSzPts val="2800"/>
-              <a:buNone/>
-            </a:pPr>
-            <a:r>
-              <a:rPr lang="en-US">
-                <a:latin typeface="Courier"/>
-                <a:ea typeface="Courier"/>
-                <a:cs typeface="Courier"/>
-                <a:sym typeface="Courier"/>
-              </a:rPr>
-              <a:t>grep gh </a:t>
-            </a:r>
-            <a:r>
-              <a:rPr lang="en-US"/>
-              <a:t>		keep lines containing ‘‘gh’’</a:t>
-            </a:r>
-            <a:endParaRPr/>
-          </a:p>
-          <a:p>
-            <a:pPr marL="7938" lvl="0" indent="-7938" algn="l" rtl="0">
-              <a:lnSpc>
-                <a:spcPct val="90000"/>
-              </a:lnSpc>
-              <a:spcBef>
-                <a:spcPts val="1050"/>
-              </a:spcBef>
-              <a:spcAft>
-                <a:spcPts val="0"/>
-              </a:spcAft>
-              <a:buSzPts val="2800"/>
-              <a:buNone/>
-            </a:pPr>
-            <a:r>
-              <a:rPr lang="en-US">
-                <a:latin typeface="Courier"/>
-                <a:ea typeface="Courier"/>
-                <a:cs typeface="Courier"/>
-                <a:sym typeface="Courier"/>
-              </a:rPr>
-              <a:t>grep 'ˆcon' </a:t>
-            </a:r>
-            <a:r>
-              <a:rPr lang="en-US"/>
-              <a:t>	keep lines beginning with ‘‘con’’ </a:t>
-            </a:r>
-            <a:endParaRPr/>
-          </a:p>
-          <a:p>
-            <a:pPr marL="7938" lvl="0" indent="-7938" algn="l" rtl="0">
-              <a:lnSpc>
-                <a:spcPct val="90000"/>
-              </a:lnSpc>
-              <a:spcBef>
-                <a:spcPts val="1050"/>
-              </a:spcBef>
-              <a:spcAft>
-                <a:spcPts val="0"/>
-              </a:spcAft>
-              <a:buSzPts val="2800"/>
-              <a:buNone/>
-            </a:pPr>
-            <a:r>
-              <a:rPr lang="en-US">
-                <a:latin typeface="Courier"/>
-                <a:ea typeface="Courier"/>
-                <a:cs typeface="Courier"/>
-                <a:sym typeface="Courier"/>
-              </a:rPr>
-              <a:t>grep 'ing$' </a:t>
-            </a:r>
-            <a:r>
-              <a:rPr lang="en-US"/>
-              <a:t>	keep lines ending with ‘‘ing’’ </a:t>
-            </a:r>
-            <a:endParaRPr/>
-          </a:p>
-          <a:p>
-            <a:pPr marL="7938" lvl="0" indent="-7938" algn="l" rtl="0">
-              <a:lnSpc>
-                <a:spcPct val="90000"/>
-              </a:lnSpc>
-              <a:spcBef>
-                <a:spcPts val="1050"/>
-              </a:spcBef>
-              <a:spcAft>
-                <a:spcPts val="0"/>
-              </a:spcAft>
-              <a:buSzPts val="2800"/>
-              <a:buNone/>
-            </a:pPr>
-            <a:r>
-              <a:rPr lang="en-US">
-                <a:latin typeface="Courier"/>
-                <a:ea typeface="Courier"/>
-                <a:cs typeface="Courier"/>
-                <a:sym typeface="Courier"/>
-              </a:rPr>
-              <a:t>grep –v gh </a:t>
-            </a:r>
-            <a:r>
-              <a:rPr lang="en-US"/>
-              <a:t>	keep lines NOT containing “gh”</a:t>
-            </a:r>
             <a:endParaRPr/>
           </a:p>
         </p:txBody>
@@ -38842,7 +38936,7 @@
         </p:spPr>
         <p:txBody>
           <a:bodyPr spcFirstLastPara="1" wrap="square" lIns="0" tIns="45700" rIns="0" bIns="45700" anchor="t" anchorCtr="0">
-            <a:normAutofit/>
+            <a:normAutofit lnSpcReduction="10000"/>
           </a:bodyPr>
           <a:lstStyle/>
           <a:p>
@@ -38861,7 +38955,7 @@
             </a:pPr>
             <a:r>
               <a:rPr lang="en-US"/>
-              <a:t>Billions of words are text are everywhere</a:t>
+              <a:t>Billions of words and text are everywhere</a:t>
             </a:r>
             <a:endParaRPr sz="2000"/>
           </a:p>
@@ -39442,7 +39536,7 @@
   <p:cSld>
     <p:spTree>
       <p:nvGrpSpPr>
-        <p:cNvPr id="1" name="Shape 363"/>
+        <p:cNvPr id="1" name="Shape 364"/>
         <p:cNvGrpSpPr/>
         <p:nvPr/>
       </p:nvGrpSpPr>
@@ -39456,7 +39550,7 @@
       </p:grpSpPr>
       <p:sp>
         <p:nvSpPr>
-          <p:cNvPr id="364" name="Google Shape;364;p20"/>
+          <p:cNvPr id="365" name="Google Shape;365;p19"/>
           <p:cNvSpPr txBox="1">
             <a:spLocks noGrp="1"/>
           </p:cNvSpPr>
@@ -39502,7 +39596,7 @@
             </a:pPr>
             <a:r>
               <a:rPr lang="en-US"/>
-              <a:t>grep versus egrep (grep –E)</a:t>
+              <a:t>grep</a:t>
             </a:r>
             <a:endParaRPr/>
           </a:p>
@@ -39510,7 +39604,252 @@
       </p:sp>
       <p:sp>
         <p:nvSpPr>
-          <p:cNvPr id="365" name="Google Shape;365;p20"/>
+          <p:cNvPr id="366" name="Google Shape;366;p19"/>
+          <p:cNvSpPr txBox="1">
+            <a:spLocks noGrp="1"/>
+          </p:cNvSpPr>
+          <p:nvPr>
+            <p:ph type="body" idx="1"/>
+          </p:nvPr>
+        </p:nvSpPr>
+        <p:spPr>
+          <a:xfrm>
+            <a:off x="457200" y="1200150"/>
+            <a:ext cx="8534400" cy="3790950"/>
+          </a:xfrm>
+          <a:prstGeom prst="rect">
+            <a:avLst/>
+          </a:prstGeom>
+          <a:noFill/>
+          <a:ln>
+            <a:noFill/>
+          </a:ln>
+        </p:spPr>
+        <p:txBody>
+          <a:bodyPr spcFirstLastPara="1" wrap="square" lIns="0" tIns="45700" rIns="0" bIns="45700" anchor="t" anchorCtr="0">
+            <a:normAutofit/>
+          </a:bodyPr>
+          <a:lstStyle/>
+          <a:p>
+            <a:pPr marL="7938" lvl="0" indent="-7938" algn="l" rtl="0">
+              <a:lnSpc>
+                <a:spcPct val="90000"/>
+              </a:lnSpc>
+              <a:spcBef>
+                <a:spcPts val="0"/>
+              </a:spcBef>
+              <a:spcAft>
+                <a:spcPts val="0"/>
+              </a:spcAft>
+              <a:buSzPts val="2800"/>
+              <a:buNone/>
+            </a:pPr>
+            <a:r>
+              <a:rPr lang="en-US"/>
+              <a:t>grep is a filter – you keep only some lines of the input</a:t>
+            </a:r>
+            <a:endParaRPr/>
+          </a:p>
+          <a:p>
+            <a:pPr marL="7938" lvl="0" indent="-7938" algn="l" rtl="0">
+              <a:lnSpc>
+                <a:spcPct val="90000"/>
+              </a:lnSpc>
+              <a:spcBef>
+                <a:spcPts val="1050"/>
+              </a:spcBef>
+              <a:spcAft>
+                <a:spcPts val="0"/>
+              </a:spcAft>
+              <a:buSzPts val="2800"/>
+              <a:buNone/>
+            </a:pPr>
+            <a:r>
+              <a:rPr lang="en-US">
+                <a:latin typeface="Courier"/>
+                <a:ea typeface="Courier"/>
+                <a:cs typeface="Courier"/>
+                <a:sym typeface="Courier"/>
+              </a:rPr>
+              <a:t>grep gh </a:t>
+            </a:r>
+            <a:r>
+              <a:rPr lang="en-US"/>
+              <a:t>		keep lines containing ‘‘gh’’</a:t>
+            </a:r>
+            <a:endParaRPr/>
+          </a:p>
+          <a:p>
+            <a:pPr marL="7938" lvl="0" indent="-7938" algn="l" rtl="0">
+              <a:lnSpc>
+                <a:spcPct val="90000"/>
+              </a:lnSpc>
+              <a:spcBef>
+                <a:spcPts val="1050"/>
+              </a:spcBef>
+              <a:spcAft>
+                <a:spcPts val="0"/>
+              </a:spcAft>
+              <a:buSzPts val="2800"/>
+              <a:buNone/>
+            </a:pPr>
+            <a:r>
+              <a:rPr lang="en-US">
+                <a:latin typeface="Courier"/>
+                <a:ea typeface="Courier"/>
+                <a:cs typeface="Courier"/>
+                <a:sym typeface="Courier"/>
+              </a:rPr>
+              <a:t>grep 'ˆcon' </a:t>
+            </a:r>
+            <a:r>
+              <a:rPr lang="en-US"/>
+              <a:t>	keep lines beginning with ‘‘con’’ </a:t>
+            </a:r>
+            <a:endParaRPr/>
+          </a:p>
+          <a:p>
+            <a:pPr marL="7938" lvl="0" indent="-7938" algn="l" rtl="0">
+              <a:lnSpc>
+                <a:spcPct val="90000"/>
+              </a:lnSpc>
+              <a:spcBef>
+                <a:spcPts val="1050"/>
+              </a:spcBef>
+              <a:spcAft>
+                <a:spcPts val="0"/>
+              </a:spcAft>
+              <a:buSzPts val="2800"/>
+              <a:buNone/>
+            </a:pPr>
+            <a:r>
+              <a:rPr lang="en-US">
+                <a:latin typeface="Courier"/>
+                <a:ea typeface="Courier"/>
+                <a:cs typeface="Courier"/>
+                <a:sym typeface="Courier"/>
+              </a:rPr>
+              <a:t>grep 'ing$' </a:t>
+            </a:r>
+            <a:r>
+              <a:rPr lang="en-US"/>
+              <a:t>	keep lines ending with ‘‘ing’’ </a:t>
+            </a:r>
+            <a:endParaRPr/>
+          </a:p>
+          <a:p>
+            <a:pPr marL="7938" lvl="0" indent="-7938" algn="l" rtl="0">
+              <a:lnSpc>
+                <a:spcPct val="90000"/>
+              </a:lnSpc>
+              <a:spcBef>
+                <a:spcPts val="1050"/>
+              </a:spcBef>
+              <a:spcAft>
+                <a:spcPts val="0"/>
+              </a:spcAft>
+              <a:buSzPts val="2800"/>
+              <a:buNone/>
+            </a:pPr>
+            <a:r>
+              <a:rPr lang="en-US">
+                <a:latin typeface="Courier"/>
+                <a:ea typeface="Courier"/>
+                <a:cs typeface="Courier"/>
+                <a:sym typeface="Courier"/>
+              </a:rPr>
+              <a:t>grep –v gh </a:t>
+            </a:r>
+            <a:r>
+              <a:rPr lang="en-US"/>
+              <a:t>	keep lines NOT containing “gh”</a:t>
+            </a:r>
+            <a:endParaRPr/>
+          </a:p>
+        </p:txBody>
+      </p:sp>
+    </p:spTree>
+  </p:cSld>
+  <p:clrMapOvr>
+    <a:masterClrMapping/>
+  </p:clrMapOvr>
+</p:sld>
+</file>
+
+<file path=ppt/slides/slide21.xml><?xml version="1.0" encoding="utf-8"?>
+<p:sld xmlns:a="http://schemas.openxmlformats.org/drawingml/2006/main" xmlns:r="http://schemas.openxmlformats.org/officeDocument/2006/relationships" xmlns:p="http://schemas.openxmlformats.org/presentationml/2006/main">
+  <p:cSld>
+    <p:spTree>
+      <p:nvGrpSpPr>
+        <p:cNvPr id="1" name="Shape 370"/>
+        <p:cNvGrpSpPr/>
+        <p:nvPr/>
+      </p:nvGrpSpPr>
+      <p:grpSpPr>
+        <a:xfrm>
+          <a:off x="0" y="0"/>
+          <a:ext cx="0" cy="0"/>
+          <a:chOff x="0" y="0"/>
+          <a:chExt cx="0" cy="0"/>
+        </a:xfrm>
+      </p:grpSpPr>
+      <p:sp>
+        <p:nvSpPr>
+          <p:cNvPr id="371" name="Google Shape;371;p20"/>
+          <p:cNvSpPr txBox="1">
+            <a:spLocks noGrp="1"/>
+          </p:cNvSpPr>
+          <p:nvPr>
+            <p:ph type="title"/>
+          </p:nvPr>
+        </p:nvSpPr>
+        <p:spPr>
+          <a:xfrm>
+            <a:off x="822960" y="119702"/>
+            <a:ext cx="7543800" cy="680397"/>
+          </a:xfrm>
+          <a:prstGeom prst="rect">
+            <a:avLst/>
+          </a:prstGeom>
+          <a:noFill/>
+          <a:ln>
+            <a:noFill/>
+          </a:ln>
+        </p:spPr>
+        <p:txBody>
+          <a:bodyPr spcFirstLastPara="1" wrap="square" lIns="91425" tIns="45700" rIns="91425" bIns="45700" anchor="b" anchorCtr="0">
+            <a:normAutofit/>
+          </a:bodyPr>
+          <a:lstStyle/>
+          <a:p>
+            <a:pPr marL="0" lvl="0" indent="0" algn="l" rtl="0">
+              <a:lnSpc>
+                <a:spcPct val="85000"/>
+              </a:lnSpc>
+              <a:spcBef>
+                <a:spcPts val="0"/>
+              </a:spcBef>
+              <a:spcAft>
+                <a:spcPts val="0"/>
+              </a:spcAft>
+              <a:buClr>
+                <a:srgbClr val="3F3F3F"/>
+              </a:buClr>
+              <a:buSzPts val="3600"/>
+              <a:buFont typeface="Calibri"/>
+              <a:buNone/>
+            </a:pPr>
+            <a:r>
+              <a:rPr lang="en-US"/>
+              <a:t>grep versus egrep (grep –E)</a:t>
+            </a:r>
+            <a:endParaRPr/>
+          </a:p>
+        </p:txBody>
+      </p:sp>
+      <p:sp>
+        <p:nvSpPr>
+          <p:cNvPr id="372" name="Google Shape;372;p20"/>
           <p:cNvSpPr txBox="1">
             <a:spLocks noGrp="1"/>
           </p:cNvSpPr>
@@ -39750,12 +40089,12 @@
 </p:sld>
 </file>
 
-<file path=ppt/slides/slide21.xml><?xml version="1.0" encoding="utf-8"?>
+<file path=ppt/slides/slide22.xml><?xml version="1.0" encoding="utf-8"?>
 <p:sld xmlns:a="http://schemas.openxmlformats.org/drawingml/2006/main" xmlns:r="http://schemas.openxmlformats.org/officeDocument/2006/relationships" xmlns:p="http://schemas.openxmlformats.org/presentationml/2006/main">
   <p:cSld>
     <p:spTree>
       <p:nvGrpSpPr>
-        <p:cNvPr id="1" name="Shape 369"/>
+        <p:cNvPr id="1" name="Shape 376"/>
         <p:cNvGrpSpPr/>
         <p:nvPr/>
       </p:nvGrpSpPr>
@@ -39769,7 +40108,7 @@
       </p:grpSpPr>
       <p:sp>
         <p:nvSpPr>
-          <p:cNvPr id="370" name="Google Shape;370;p21"/>
+          <p:cNvPr id="377" name="Google Shape;377;p21"/>
           <p:cNvSpPr txBox="1">
             <a:spLocks noGrp="1"/>
           </p:cNvSpPr>
@@ -39823,7 +40162,7 @@
       </p:sp>
       <p:sp>
         <p:nvSpPr>
-          <p:cNvPr id="371" name="Google Shape;371;p21"/>
+          <p:cNvPr id="378" name="Google Shape;378;p21"/>
           <p:cNvSpPr txBox="1">
             <a:spLocks noGrp="1"/>
           </p:cNvSpPr>
@@ -39915,12 +40254,12 @@
 </p:sld>
 </file>
 
-<file path=ppt/slides/slide22.xml><?xml version="1.0" encoding="utf-8"?>
+<file path=ppt/slides/slide23.xml><?xml version="1.0" encoding="utf-8"?>
 <p:sld xmlns:a="http://schemas.openxmlformats.org/drawingml/2006/main" xmlns:r="http://schemas.openxmlformats.org/officeDocument/2006/relationships" xmlns:p="http://schemas.openxmlformats.org/presentationml/2006/main">
   <p:cSld>
     <p:spTree>
       <p:nvGrpSpPr>
-        <p:cNvPr id="1" name="Shape 375"/>
+        <p:cNvPr id="1" name="Shape 382"/>
         <p:cNvGrpSpPr/>
         <p:nvPr/>
       </p:nvGrpSpPr>
@@ -39934,7 +40273,7 @@
       </p:grpSpPr>
       <p:sp>
         <p:nvSpPr>
-          <p:cNvPr id="376" name="Google Shape;376;p22"/>
+          <p:cNvPr id="383" name="Google Shape;383;p22"/>
           <p:cNvSpPr txBox="1">
             <a:spLocks noGrp="1"/>
           </p:cNvSpPr>
@@ -39988,7 +40327,7 @@
       </p:sp>
       <p:sp>
         <p:nvSpPr>
-          <p:cNvPr id="377" name="Google Shape;377;p22"/>
+          <p:cNvPr id="384" name="Google Shape;384;p22"/>
           <p:cNvSpPr txBox="1">
             <a:spLocks noGrp="1"/>
           </p:cNvSpPr>
@@ -40258,12 +40597,12 @@
 </p:sld>
 </file>
 
-<file path=ppt/slides/slide23.xml><?xml version="1.0" encoding="utf-8"?>
+<file path=ppt/slides/slide24.xml><?xml version="1.0" encoding="utf-8"?>
 <p:sld xmlns:a="http://schemas.openxmlformats.org/drawingml/2006/main" xmlns:r="http://schemas.openxmlformats.org/officeDocument/2006/relationships" xmlns:p="http://schemas.openxmlformats.org/presentationml/2006/main">
   <p:cSld>
     <p:spTree>
       <p:nvGrpSpPr>
-        <p:cNvPr id="1" name="Shape 381"/>
+        <p:cNvPr id="1" name="Shape 388"/>
         <p:cNvGrpSpPr/>
         <p:nvPr/>
       </p:nvGrpSpPr>
@@ -40277,7 +40616,7 @@
       </p:grpSpPr>
       <p:sp>
         <p:nvSpPr>
-          <p:cNvPr id="382" name="Google Shape;382;p23"/>
+          <p:cNvPr id="389" name="Google Shape;389;p23"/>
           <p:cNvSpPr txBox="1">
             <a:spLocks noGrp="1"/>
           </p:cNvSpPr>
@@ -40331,7 +40670,7 @@
       </p:sp>
       <p:sp>
         <p:nvSpPr>
-          <p:cNvPr id="383" name="Google Shape;383;p23"/>
+          <p:cNvPr id="390" name="Google Shape;390;p23"/>
           <p:cNvSpPr txBox="1">
             <a:spLocks noGrp="1"/>
           </p:cNvSpPr>
@@ -40459,12 +40798,12 @@
 </p:sld>
 </file>
 
-<file path=ppt/slides/slide24.xml><?xml version="1.0" encoding="utf-8"?>
+<file path=ppt/slides/slide25.xml><?xml version="1.0" encoding="utf-8"?>
 <p:sld xmlns:a="http://schemas.openxmlformats.org/drawingml/2006/main" xmlns:r="http://schemas.openxmlformats.org/officeDocument/2006/relationships" xmlns:p="http://schemas.openxmlformats.org/presentationml/2006/main">
   <p:cSld>
     <p:spTree>
       <p:nvGrpSpPr>
-        <p:cNvPr id="1" name="Shape 387"/>
+        <p:cNvPr id="1" name="Shape 394"/>
         <p:cNvGrpSpPr/>
         <p:nvPr/>
       </p:nvGrpSpPr>
@@ -40478,7 +40817,7 @@
       </p:grpSpPr>
       <p:sp>
         <p:nvSpPr>
-          <p:cNvPr id="388" name="Google Shape;388;p24"/>
+          <p:cNvPr id="395" name="Google Shape;395;p24"/>
           <p:cNvSpPr txBox="1">
             <a:spLocks noGrp="1"/>
           </p:cNvSpPr>
@@ -40532,7 +40871,7 @@
       </p:sp>
       <p:sp>
         <p:nvSpPr>
-          <p:cNvPr id="389" name="Google Shape;389;p24"/>
+          <p:cNvPr id="396" name="Google Shape;396;p24"/>
           <p:cNvSpPr txBox="1">
             <a:spLocks noGrp="1"/>
           </p:cNvSpPr>
@@ -40542,8 +40881,8 @@
         </p:nvSpPr>
         <p:spPr>
           <a:xfrm>
-            <a:off x="609600" y="1073149"/>
-            <a:ext cx="8305800" cy="3823648"/>
+            <a:off x="609600" y="1200150"/>
+            <a:ext cx="8305800" cy="3823500"/>
           </a:xfrm>
           <a:prstGeom prst="rect">
             <a:avLst/>
@@ -40555,7 +40894,7 @@
         </p:spPr>
         <p:txBody>
           <a:bodyPr spcFirstLastPara="1" wrap="square" lIns="0" tIns="45700" rIns="0" bIns="45700" anchor="t" anchorCtr="0">
-            <a:normAutofit lnSpcReduction="10000"/>
+            <a:normAutofit/>
           </a:bodyPr>
           <a:lstStyle/>
           <a:p>
@@ -40573,7 +40912,7 @@
               <a:buNone/>
             </a:pPr>
             <a:r>
-              <a:rPr lang="en-US" sz="2400" b="0" i="0" u="none" strike="noStrike" dirty="0">
+              <a:rPr lang="en-US" sz="2400" b="0" i="0" u="none" strike="noStrike">
                 <a:solidFill>
                   <a:srgbClr val="000000"/>
                 </a:solidFill>
@@ -40585,7 +40924,7 @@
               <a:t>The text for today’s lab comes from the </a:t>
             </a:r>
             <a:r>
-              <a:rPr lang="en-US" sz="2400" b="0" i="0" u="sng" strike="noStrike" dirty="0">
+              <a:rPr lang="en-US" sz="2400" b="0" i="0" u="sng" strike="noStrike">
                 <a:solidFill>
                   <a:srgbClr val="1155CC"/>
                 </a:solidFill>
@@ -40604,7 +40943,7 @@
               <a:t>New York Times Annotated Corpus</a:t>
             </a:r>
             <a:r>
-              <a:rPr lang="en-US" sz="2400" b="0" i="0" u="none" strike="noStrike" dirty="0">
+              <a:rPr lang="en-US" sz="2400" b="0" i="0" u="none" strike="noStrike">
                 <a:solidFill>
                   <a:srgbClr val="000000"/>
                 </a:solidFill>
@@ -40615,7 +40954,7 @@
               </a:rPr>
               <a:t>, released by the Linguistic Data Consortium. </a:t>
             </a:r>
-            <a:endParaRPr dirty="0"/>
+            <a:endParaRPr/>
           </a:p>
           <a:p>
             <a:pPr marL="7938" lvl="0" indent="0" algn="l" rtl="0">
@@ -40632,7 +40971,7 @@
               <a:buNone/>
             </a:pPr>
             <a:r>
-              <a:rPr lang="en-US" sz="2400" b="0" i="0" u="none" strike="noStrike" dirty="0">
+              <a:rPr lang="en-US" sz="2400" b="0" i="0" u="none" strike="noStrike">
                 <a:solidFill>
                   <a:srgbClr val="000000"/>
                 </a:solidFill>
@@ -40643,7 +40982,7 @@
               </a:rPr>
               <a:t>Understanding a dataset's origins gives us insight into its scope and  limitations, which can affect the conclusions we draw from it. </a:t>
             </a:r>
-            <a:endParaRPr dirty="0"/>
+            <a:endParaRPr/>
           </a:p>
           <a:p>
             <a:pPr marL="7938" lvl="0" indent="0" algn="l" rtl="0">
@@ -40660,7 +40999,7 @@
               <a:buNone/>
             </a:pPr>
             <a:r>
-              <a:rPr lang="en-US" sz="2400" b="0" i="0" u="none" strike="noStrike" dirty="0">
+              <a:rPr lang="en-US" sz="2400" b="0" i="0" u="none" strike="noStrike">
                 <a:solidFill>
                   <a:srgbClr val="000000"/>
                 </a:solidFill>
@@ -40671,7 +41010,7 @@
               </a:rPr>
               <a:t>Take a few minutes with your group to explore the origins of this text. </a:t>
             </a:r>
-            <a:endParaRPr dirty="0"/>
+            <a:endParaRPr/>
           </a:p>
           <a:p>
             <a:pPr marL="7938" lvl="0" indent="0" algn="l" rtl="0">
@@ -40688,7 +41027,7 @@
               <a:buNone/>
             </a:pPr>
             <a:r>
-              <a:rPr lang="en-US" sz="2400" b="1" i="0" u="none" strike="noStrike" dirty="0">
+              <a:rPr lang="en-US" sz="2400" b="1" i="0" u="none" strike="noStrike">
                 <a:solidFill>
                   <a:srgbClr val="000000"/>
                 </a:solidFill>
@@ -40699,7 +41038,7 @@
               </a:rPr>
               <a:t>What types of texts, from what time period, genre, and language, are included in this dataset? </a:t>
             </a:r>
-            <a:endParaRPr dirty="0"/>
+            <a:endParaRPr/>
           </a:p>
           <a:p>
             <a:pPr marL="7938" lvl="0" indent="0" algn="l" rtl="0">
@@ -40716,7 +41055,7 @@
               <a:buNone/>
             </a:pPr>
             <a:r>
-              <a:rPr lang="en-US" sz="2400" b="1" i="0" u="none" strike="noStrike" dirty="0">
+              <a:rPr lang="en-US" sz="2400" b="1" i="0" u="none" strike="noStrike">
                 <a:solidFill>
                   <a:srgbClr val="000000"/>
                 </a:solidFill>
@@ -40728,7 +41067,7 @@
               <a:t>What types are not? </a:t>
             </a:r>
             <a:r>
-              <a:rPr lang="en-US" sz="2400" b="0" i="0" u="none" strike="noStrike" dirty="0">
+              <a:rPr lang="en-US" sz="2400" b="0" i="0" u="none" strike="noStrike">
                 <a:solidFill>
                   <a:srgbClr val="000000"/>
                 </a:solidFill>
@@ -40740,7 +41079,7 @@
               <a:t>Then, answer questions</a:t>
             </a:r>
             <a:r>
-              <a:rPr lang="en-US" sz="2400" dirty="0">
+              <a:rPr lang="en-US" sz="2400">
                 <a:solidFill>
                   <a:srgbClr val="000000"/>
                 </a:solidFill>
@@ -40751,7 +41090,7 @@
               </a:rPr>
               <a:t> on the following slide</a:t>
             </a:r>
-            <a:endParaRPr sz="2400" b="0" dirty="0">
+            <a:endParaRPr sz="2400" b="0">
               <a:latin typeface="Calibri"/>
               <a:ea typeface="Calibri"/>
               <a:cs typeface="Calibri"/>
@@ -40772,7 +41111,7 @@
               <a:buSzPts val="2400"/>
               <a:buNone/>
             </a:pPr>
-            <a:endParaRPr sz="2400" dirty="0">
+            <a:endParaRPr sz="2400">
               <a:latin typeface="Calibri"/>
               <a:ea typeface="Calibri"/>
               <a:cs typeface="Calibri"/>
@@ -40789,12 +41128,12 @@
 </p:sld>
 </file>
 
-<file path=ppt/slides/slide25.xml><?xml version="1.0" encoding="utf-8"?>
+<file path=ppt/slides/slide26.xml><?xml version="1.0" encoding="utf-8"?>
 <p:sld xmlns:a="http://schemas.openxmlformats.org/drawingml/2006/main" xmlns:r="http://schemas.openxmlformats.org/officeDocument/2006/relationships" xmlns:p="http://schemas.openxmlformats.org/presentationml/2006/main">
   <p:cSld>
     <p:spTree>
       <p:nvGrpSpPr>
-        <p:cNvPr id="1" name="Shape 393"/>
+        <p:cNvPr id="1" name="Shape 400"/>
         <p:cNvGrpSpPr/>
         <p:nvPr/>
       </p:nvGrpSpPr>
@@ -40808,7 +41147,7 @@
       </p:grpSpPr>
       <p:sp>
         <p:nvSpPr>
-          <p:cNvPr id="394" name="Google Shape;394;p25"/>
+          <p:cNvPr id="401" name="Google Shape;401;p25"/>
           <p:cNvSpPr txBox="1">
             <a:spLocks noGrp="1"/>
           </p:cNvSpPr>
@@ -40862,7 +41201,7 @@
       </p:sp>
       <p:sp>
         <p:nvSpPr>
-          <p:cNvPr id="395" name="Google Shape;395;p25"/>
+          <p:cNvPr id="402" name="Google Shape;402;p25"/>
           <p:cNvSpPr txBox="1">
             <a:spLocks noGrp="1"/>
           </p:cNvSpPr>
@@ -40872,8 +41211,8 @@
         </p:nvSpPr>
         <p:spPr>
           <a:xfrm>
-            <a:off x="822960" y="1166282"/>
-            <a:ext cx="8244840" cy="3943350"/>
+            <a:off x="822960" y="800099"/>
+            <a:ext cx="8244840" cy="4343401"/>
           </a:xfrm>
           <a:prstGeom prst="rect">
             <a:avLst/>
@@ -40885,7 +41224,7 @@
         </p:spPr>
         <p:txBody>
           <a:bodyPr spcFirstLastPara="1" wrap="square" lIns="0" tIns="45700" rIns="0" bIns="45700" anchor="t" anchorCtr="0">
-            <a:normAutofit lnSpcReduction="10000"/>
+            <a:normAutofit/>
           </a:bodyPr>
           <a:lstStyle/>
           <a:p>
@@ -41064,12 +41403,12 @@
 </p:sld>
 </file>
 
-<file path=ppt/slides/slide26.xml><?xml version="1.0" encoding="utf-8"?>
+<file path=ppt/slides/slide27.xml><?xml version="1.0" encoding="utf-8"?>
 <p:sld xmlns:a="http://schemas.openxmlformats.org/drawingml/2006/main" xmlns:r="http://schemas.openxmlformats.org/officeDocument/2006/relationships" xmlns:p="http://schemas.openxmlformats.org/presentationml/2006/main">
   <p:cSld>
     <p:spTree>
       <p:nvGrpSpPr>
-        <p:cNvPr id="1" name="Shape 399"/>
+        <p:cNvPr id="1" name="Shape 406"/>
         <p:cNvGrpSpPr/>
         <p:nvPr/>
       </p:nvGrpSpPr>
@@ -41083,7 +41422,7 @@
       </p:grpSpPr>
       <p:sp>
         <p:nvSpPr>
-          <p:cNvPr id="400" name="Google Shape;400;p26"/>
+          <p:cNvPr id="407" name="Google Shape;407;p26"/>
           <p:cNvSpPr txBox="1">
             <a:spLocks noGrp="1"/>
           </p:cNvSpPr>
@@ -41137,7 +41476,7 @@
       </p:sp>
       <p:sp>
         <p:nvSpPr>
-          <p:cNvPr id="401" name="Google Shape;401;p26"/>
+          <p:cNvPr id="408" name="Google Shape;408;p26"/>
           <p:cNvSpPr txBox="1">
             <a:spLocks noGrp="1"/>
           </p:cNvSpPr>
@@ -41348,12 +41687,12 @@
 </p:sld>
 </file>
 
-<file path=ppt/slides/slide27.xml><?xml version="1.0" encoding="utf-8"?>
+<file path=ppt/slides/slide28.xml><?xml version="1.0" encoding="utf-8"?>
 <p:sld xmlns:a="http://schemas.openxmlformats.org/drawingml/2006/main" xmlns:r="http://schemas.openxmlformats.org/officeDocument/2006/relationships" xmlns:p="http://schemas.openxmlformats.org/presentationml/2006/main">
   <p:cSld>
     <p:spTree>
       <p:nvGrpSpPr>
-        <p:cNvPr id="1" name="Shape 405"/>
+        <p:cNvPr id="1" name="Shape 412"/>
         <p:cNvGrpSpPr/>
         <p:nvPr/>
       </p:nvGrpSpPr>
@@ -41367,7 +41706,7 @@
       </p:grpSpPr>
       <p:sp>
         <p:nvSpPr>
-          <p:cNvPr id="406" name="Google Shape;406;p27"/>
+          <p:cNvPr id="413" name="Google Shape;413;p27"/>
           <p:cNvSpPr txBox="1">
             <a:spLocks noGrp="1"/>
           </p:cNvSpPr>
@@ -41413,7 +41752,7 @@
       </p:sp>
       <p:sp>
         <p:nvSpPr>
-          <p:cNvPr id="407" name="Google Shape;407;p27"/>
+          <p:cNvPr id="414" name="Google Shape;414;p27"/>
           <p:cNvSpPr txBox="1">
             <a:spLocks noGrp="1"/>
           </p:cNvSpPr>
@@ -41442,33 +41781,6 @@
           <a:p>
             <a:pPr marL="342900" lvl="0" indent="-330200" algn="l" rtl="0">
               <a:spcBef>
-                <a:spcPts val="0"/>
-              </a:spcBef>
-              <a:spcAft>
-                <a:spcPts val="0"/>
-              </a:spcAft>
-              <a:buSzPts val="2200"/>
-              <a:buChar char="•"/>
-            </a:pPr>
-            <a:r>
-              <a:rPr lang="en-US" sz="2200">
-                <a:latin typeface="Courier"/>
-                <a:ea typeface="Courier"/>
-                <a:cs typeface="Courier"/>
-                <a:sym typeface="Courier"/>
-              </a:rPr>
-              <a:t>tr -sc 'A-Za-z' '\n' &lt; nyt_200811.txt &gt; nyt.words</a:t>
-            </a:r>
-            <a:endParaRPr sz="2200">
-              <a:latin typeface="Courier"/>
-              <a:ea typeface="Courier"/>
-              <a:cs typeface="Courier"/>
-              <a:sym typeface="Courier"/>
-            </a:endParaRPr>
-          </a:p>
-          <a:p>
-            <a:pPr marL="342900" lvl="0" indent="-330200" algn="l" rtl="0">
-              <a:spcBef>
                 <a:spcPts val="480"/>
               </a:spcBef>
               <a:spcAft>
@@ -41538,7 +41850,7 @@
                 <a:cs typeface="Courier"/>
                 <a:sym typeface="Courier"/>
               </a:rPr>
-              <a:t>head –n 5 nyt.bigrams</a:t>
+              <a:t>head -n 5 nyt.bigrams</a:t>
             </a:r>
             <a:endParaRPr sz="2200">
               <a:latin typeface="Courier"/>
@@ -41699,12 +42011,12 @@
 </p:sld>
 </file>
 
-<file path=ppt/slides/slide28.xml><?xml version="1.0" encoding="utf-8"?>
+<file path=ppt/slides/slide29.xml><?xml version="1.0" encoding="utf-8"?>
 <p:sld xmlns:a="http://schemas.openxmlformats.org/drawingml/2006/main" xmlns:r="http://schemas.openxmlformats.org/officeDocument/2006/relationships" xmlns:p="http://schemas.openxmlformats.org/presentationml/2006/main">
   <p:cSld>
     <p:spTree>
       <p:nvGrpSpPr>
-        <p:cNvPr id="1" name="Shape 411"/>
+        <p:cNvPr id="1" name="Shape 418"/>
         <p:cNvGrpSpPr/>
         <p:nvPr/>
       </p:nvGrpSpPr>
@@ -41718,7 +42030,7 @@
       </p:grpSpPr>
       <p:sp>
         <p:nvSpPr>
-          <p:cNvPr id="412" name="Google Shape;412;p28"/>
+          <p:cNvPr id="419" name="Google Shape;419;p28"/>
           <p:cNvSpPr txBox="1">
             <a:spLocks noGrp="1"/>
           </p:cNvSpPr>
@@ -41772,7 +42084,7 @@
       </p:sp>
       <p:sp>
         <p:nvSpPr>
-          <p:cNvPr id="413" name="Google Shape;413;p28"/>
+          <p:cNvPr id="420" name="Google Shape;420;p28"/>
           <p:cNvSpPr txBox="1">
             <a:spLocks noGrp="1"/>
           </p:cNvSpPr>
@@ -41853,495 +42165,6 @@
               <a:buNone/>
             </a:pPr>
             <a:endParaRPr sz="2400"/>
-          </a:p>
-        </p:txBody>
-      </p:sp>
-    </p:spTree>
-  </p:cSld>
-  <p:clrMapOvr>
-    <a:masterClrMapping/>
-  </p:clrMapOvr>
-</p:sld>
-</file>
-
-<file path=ppt/slides/slide29.xml><?xml version="1.0" encoding="utf-8"?>
-<p:sld xmlns:a="http://schemas.openxmlformats.org/drawingml/2006/main" xmlns:r="http://schemas.openxmlformats.org/officeDocument/2006/relationships" xmlns:p="http://schemas.openxmlformats.org/presentationml/2006/main">
-  <p:cSld>
-    <p:spTree>
-      <p:nvGrpSpPr>
-        <p:cNvPr id="1" name="Shape 417"/>
-        <p:cNvGrpSpPr/>
-        <p:nvPr/>
-      </p:nvGrpSpPr>
-      <p:grpSpPr>
-        <a:xfrm>
-          <a:off x="0" y="0"/>
-          <a:ext cx="0" cy="0"/>
-          <a:chOff x="0" y="0"/>
-          <a:chExt cx="0" cy="0"/>
-        </a:xfrm>
-      </p:grpSpPr>
-      <p:sp>
-        <p:nvSpPr>
-          <p:cNvPr id="418" name="Google Shape;418;p29"/>
-          <p:cNvSpPr txBox="1">
-            <a:spLocks noGrp="1"/>
-          </p:cNvSpPr>
-          <p:nvPr>
-            <p:ph type="title"/>
-          </p:nvPr>
-        </p:nvSpPr>
-        <p:spPr>
-          <a:xfrm>
-            <a:off x="822960" y="119702"/>
-            <a:ext cx="7543800" cy="680397"/>
-          </a:xfrm>
-          <a:prstGeom prst="rect">
-            <a:avLst/>
-          </a:prstGeom>
-          <a:noFill/>
-          <a:ln>
-            <a:noFill/>
-          </a:ln>
-        </p:spPr>
-        <p:txBody>
-          <a:bodyPr spcFirstLastPara="1" wrap="square" lIns="91425" tIns="45700" rIns="91425" bIns="45700" anchor="b" anchorCtr="0">
-            <a:normAutofit/>
-          </a:bodyPr>
-          <a:lstStyle/>
-          <a:p>
-            <a:pPr marL="0" lvl="0" indent="0" algn="l" rtl="0">
-              <a:lnSpc>
-                <a:spcPct val="85000"/>
-              </a:lnSpc>
-              <a:spcBef>
-                <a:spcPts val="0"/>
-              </a:spcBef>
-              <a:spcAft>
-                <a:spcPts val="0"/>
-              </a:spcAft>
-              <a:buClr>
-                <a:srgbClr val="3F3F3F"/>
-              </a:buClr>
-              <a:buSzPts val="3600"/>
-              <a:buFont typeface="Calibri"/>
-              <a:buNone/>
-            </a:pPr>
-            <a:r>
-              <a:rPr lang="en-US"/>
-              <a:t>Ex 6 Solutions</a:t>
-            </a:r>
-            <a:endParaRPr/>
-          </a:p>
-        </p:txBody>
-      </p:sp>
-      <p:sp>
-        <p:nvSpPr>
-          <p:cNvPr id="419" name="Google Shape;419;p29"/>
-          <p:cNvSpPr txBox="1">
-            <a:spLocks noGrp="1"/>
-          </p:cNvSpPr>
-          <p:nvPr>
-            <p:ph type="body" idx="1"/>
-          </p:nvPr>
-        </p:nvSpPr>
-        <p:spPr>
-          <a:xfrm>
-            <a:off x="822950" y="800100"/>
-            <a:ext cx="8102700" cy="4112100"/>
-          </a:xfrm>
-          <a:prstGeom prst="rect">
-            <a:avLst/>
-          </a:prstGeom>
-          <a:noFill/>
-          <a:ln>
-            <a:noFill/>
-          </a:ln>
-        </p:spPr>
-        <p:txBody>
-          <a:bodyPr spcFirstLastPara="1" wrap="square" lIns="0" tIns="45700" rIns="0" bIns="45700" anchor="t" anchorCtr="0">
-            <a:normAutofit fontScale="92500" lnSpcReduction="20000"/>
-          </a:bodyPr>
-          <a:lstStyle/>
-          <a:p>
-            <a:pPr marL="7937" lvl="0" indent="-7937" algn="l" rtl="0">
-              <a:lnSpc>
-                <a:spcPct val="90000"/>
-              </a:lnSpc>
-              <a:spcBef>
-                <a:spcPts val="0"/>
-              </a:spcBef>
-              <a:spcAft>
-                <a:spcPts val="0"/>
-              </a:spcAft>
-              <a:buSzPct val="100000"/>
-              <a:buNone/>
-            </a:pPr>
-            <a:r>
-              <a:rPr lang="en-US" sz="2800"/>
-              <a:t>Find the 10 most common bigrams</a:t>
-            </a:r>
-            <a:endParaRPr sz="2800"/>
-          </a:p>
-          <a:p>
-            <a:pPr marL="7938" lvl="0" indent="-7938" algn="l" rtl="0">
-              <a:lnSpc>
-                <a:spcPct val="90000"/>
-              </a:lnSpc>
-              <a:spcBef>
-                <a:spcPts val="0"/>
-              </a:spcBef>
-              <a:spcAft>
-                <a:spcPts val="0"/>
-              </a:spcAft>
-              <a:buSzPct val="100000"/>
-              <a:buNone/>
-            </a:pPr>
-            <a:endParaRPr/>
-          </a:p>
-          <a:p>
-            <a:pPr marL="0" lvl="1" indent="0" algn="l" rtl="0">
-              <a:lnSpc>
-                <a:spcPct val="90000"/>
-              </a:lnSpc>
-              <a:spcBef>
-                <a:spcPts val="300"/>
-              </a:spcBef>
-              <a:spcAft>
-                <a:spcPts val="0"/>
-              </a:spcAft>
-              <a:buSzPct val="100000"/>
-              <a:buNone/>
-            </a:pPr>
-            <a:r>
-              <a:rPr lang="en-US" sz="2400">
-                <a:latin typeface="Courier"/>
-                <a:ea typeface="Courier"/>
-                <a:cs typeface="Courier"/>
-                <a:sym typeface="Courier"/>
-              </a:rPr>
-              <a:t>tr 'A-Z' 'a-z' &lt; nyt.bigrams | sort | uniq -c | sort -nr | head -n 10 </a:t>
-            </a:r>
-            <a:endParaRPr sz="2400">
-              <a:latin typeface="Courier"/>
-              <a:ea typeface="Courier"/>
-              <a:cs typeface="Courier"/>
-              <a:sym typeface="Courier"/>
-            </a:endParaRPr>
-          </a:p>
-          <a:p>
-            <a:pPr marL="0" lvl="0" indent="0" algn="l" rtl="0">
-              <a:spcBef>
-                <a:spcPts val="300"/>
-              </a:spcBef>
-              <a:spcAft>
-                <a:spcPts val="0"/>
-              </a:spcAft>
-              <a:buClr>
-                <a:schemeClr val="dk1"/>
-              </a:buClr>
-              <a:buSzPct val="39285"/>
-              <a:buFont typeface="Arial"/>
-              <a:buNone/>
-            </a:pPr>
-            <a:endParaRPr>
-              <a:solidFill>
-                <a:schemeClr val="dk1"/>
-              </a:solidFill>
-              <a:latin typeface="Courier"/>
-              <a:ea typeface="Courier"/>
-              <a:cs typeface="Courier"/>
-              <a:sym typeface="Courier"/>
-            </a:endParaRPr>
-          </a:p>
-          <a:p>
-            <a:pPr marL="0" lvl="1" indent="0" algn="l" rtl="0">
-              <a:lnSpc>
-                <a:spcPct val="90000"/>
-              </a:lnSpc>
-              <a:spcBef>
-                <a:spcPts val="300"/>
-              </a:spcBef>
-              <a:spcAft>
-                <a:spcPts val="0"/>
-              </a:spcAft>
-              <a:buSzPct val="156468"/>
-              <a:buNone/>
-            </a:pPr>
-            <a:endParaRPr sz="1533">
-              <a:solidFill>
-                <a:schemeClr val="dk1"/>
-              </a:solidFill>
-              <a:latin typeface="Arial"/>
-              <a:ea typeface="Arial"/>
-              <a:cs typeface="Arial"/>
-              <a:sym typeface="Arial"/>
-            </a:endParaRPr>
-          </a:p>
-          <a:p>
-            <a:pPr marL="0" lvl="1" indent="0" algn="l" rtl="0">
-              <a:lnSpc>
-                <a:spcPct val="90000"/>
-              </a:lnSpc>
-              <a:spcBef>
-                <a:spcPts val="300"/>
-              </a:spcBef>
-              <a:spcAft>
-                <a:spcPts val="0"/>
-              </a:spcAft>
-              <a:buSzPct val="117073"/>
-              <a:buNone/>
-            </a:pPr>
-            <a:r>
-              <a:rPr lang="en-US" sz="2049">
-                <a:solidFill>
-                  <a:schemeClr val="dk1"/>
-                </a:solidFill>
-                <a:latin typeface="Courier"/>
-                <a:ea typeface="Courier"/>
-                <a:cs typeface="Courier"/>
-                <a:sym typeface="Courier"/>
-              </a:rPr>
-              <a:t>cat nyt.bigrams | tr "[:upper:]" "[:lower:]" | sort | uniq -c | sort -rn | head -n 10</a:t>
-            </a:r>
-            <a:endParaRPr sz="2049">
-              <a:solidFill>
-                <a:schemeClr val="dk1"/>
-              </a:solidFill>
-              <a:latin typeface="Courier"/>
-              <a:ea typeface="Courier"/>
-              <a:cs typeface="Courier"/>
-              <a:sym typeface="Courier"/>
-            </a:endParaRPr>
-          </a:p>
-          <a:p>
-            <a:pPr marL="0" lvl="1" indent="0" algn="l" rtl="0">
-              <a:lnSpc>
-                <a:spcPct val="90000"/>
-              </a:lnSpc>
-              <a:spcBef>
-                <a:spcPts val="300"/>
-              </a:spcBef>
-              <a:spcAft>
-                <a:spcPts val="0"/>
-              </a:spcAft>
-              <a:buSzPct val="117073"/>
-              <a:buNone/>
-            </a:pPr>
-            <a:endParaRPr sz="2049">
-              <a:solidFill>
-                <a:schemeClr val="dk1"/>
-              </a:solidFill>
-            </a:endParaRPr>
-          </a:p>
-          <a:p>
-            <a:pPr marL="0" lvl="1" indent="0" algn="l" rtl="0">
-              <a:lnSpc>
-                <a:spcPct val="90000"/>
-              </a:lnSpc>
-              <a:spcBef>
-                <a:spcPts val="300"/>
-              </a:spcBef>
-              <a:spcAft>
-                <a:spcPts val="0"/>
-              </a:spcAft>
-              <a:buSzPct val="156468"/>
-              <a:buNone/>
-            </a:pPr>
-            <a:endParaRPr sz="1533">
-              <a:solidFill>
-                <a:schemeClr val="dk1"/>
-              </a:solidFill>
-              <a:latin typeface="Arial"/>
-              <a:ea typeface="Arial"/>
-              <a:cs typeface="Arial"/>
-              <a:sym typeface="Arial"/>
-            </a:endParaRPr>
-          </a:p>
-          <a:p>
-            <a:pPr marL="0" lvl="1" indent="0" algn="l" rtl="0">
-              <a:lnSpc>
-                <a:spcPct val="90000"/>
-              </a:lnSpc>
-              <a:spcBef>
-                <a:spcPts val="300"/>
-              </a:spcBef>
-              <a:spcAft>
-                <a:spcPts val="0"/>
-              </a:spcAft>
-              <a:buSzPct val="102127"/>
-              <a:buNone/>
-            </a:pPr>
-            <a:r>
-              <a:rPr lang="en-US" sz="2350">
-                <a:solidFill>
-                  <a:srgbClr val="E48312"/>
-                </a:solidFill>
-              </a:rPr>
-              <a:t>1.</a:t>
-            </a:r>
-            <a:r>
-              <a:rPr lang="en-US" sz="2350">
-                <a:solidFill>
-                  <a:schemeClr val="dk1"/>
-                </a:solidFill>
-              </a:rPr>
-              <a:t> lowercase bigrams</a:t>
-            </a:r>
-            <a:endParaRPr sz="2350">
-              <a:solidFill>
-                <a:schemeClr val="dk1"/>
-              </a:solidFill>
-            </a:endParaRPr>
-          </a:p>
-          <a:p>
-            <a:pPr marL="0" lvl="1" indent="0" algn="l" rtl="0">
-              <a:lnSpc>
-                <a:spcPct val="90000"/>
-              </a:lnSpc>
-              <a:spcBef>
-                <a:spcPts val="300"/>
-              </a:spcBef>
-              <a:spcAft>
-                <a:spcPts val="0"/>
-              </a:spcAft>
-              <a:buSzPct val="102127"/>
-              <a:buNone/>
-            </a:pPr>
-            <a:r>
-              <a:rPr lang="en-US" sz="2350">
-                <a:solidFill>
-                  <a:srgbClr val="E48312"/>
-                </a:solidFill>
-              </a:rPr>
-              <a:t>2.</a:t>
-            </a:r>
-            <a:r>
-              <a:rPr lang="en-US" sz="2350">
-                <a:solidFill>
-                  <a:schemeClr val="dk1"/>
-                </a:solidFill>
-              </a:rPr>
-              <a:t> sort alphabetically</a:t>
-            </a:r>
-            <a:endParaRPr sz="2350">
-              <a:solidFill>
-                <a:schemeClr val="dk1"/>
-              </a:solidFill>
-            </a:endParaRPr>
-          </a:p>
-          <a:p>
-            <a:pPr marL="0" lvl="1" indent="0" algn="l" rtl="0">
-              <a:lnSpc>
-                <a:spcPct val="90000"/>
-              </a:lnSpc>
-              <a:spcBef>
-                <a:spcPts val="300"/>
-              </a:spcBef>
-              <a:spcAft>
-                <a:spcPts val="0"/>
-              </a:spcAft>
-              <a:buSzPct val="102127"/>
-              <a:buNone/>
-            </a:pPr>
-            <a:r>
-              <a:rPr lang="en-US" sz="2350">
-                <a:solidFill>
-                  <a:srgbClr val="E48312"/>
-                </a:solidFill>
-              </a:rPr>
-              <a:t>3.</a:t>
-            </a:r>
-            <a:r>
-              <a:rPr lang="en-US" sz="2350">
-                <a:solidFill>
-                  <a:schemeClr val="dk1"/>
-                </a:solidFill>
-              </a:rPr>
-              <a:t> count </a:t>
-            </a:r>
-            <a:endParaRPr sz="2350">
-              <a:solidFill>
-                <a:schemeClr val="dk1"/>
-              </a:solidFill>
-            </a:endParaRPr>
-          </a:p>
-          <a:p>
-            <a:pPr marL="0" lvl="1" indent="0" algn="l" rtl="0">
-              <a:lnSpc>
-                <a:spcPct val="90000"/>
-              </a:lnSpc>
-              <a:spcBef>
-                <a:spcPts val="300"/>
-              </a:spcBef>
-              <a:spcAft>
-                <a:spcPts val="0"/>
-              </a:spcAft>
-              <a:buSzPct val="102127"/>
-              <a:buNone/>
-            </a:pPr>
-            <a:r>
-              <a:rPr lang="en-US" sz="2350">
-                <a:solidFill>
-                  <a:srgbClr val="E48312"/>
-                </a:solidFill>
-              </a:rPr>
-              <a:t>4.</a:t>
-            </a:r>
-            <a:r>
-              <a:rPr lang="en-US" sz="2350">
-                <a:solidFill>
-                  <a:schemeClr val="dk1"/>
-                </a:solidFill>
-              </a:rPr>
-              <a:t> sort in descending order by number</a:t>
-            </a:r>
-            <a:endParaRPr sz="2350">
-              <a:solidFill>
-                <a:schemeClr val="dk1"/>
-              </a:solidFill>
-            </a:endParaRPr>
-          </a:p>
-          <a:p>
-            <a:pPr marL="0" lvl="0" indent="0" algn="l" rtl="0">
-              <a:spcBef>
-                <a:spcPts val="300"/>
-              </a:spcBef>
-              <a:spcAft>
-                <a:spcPts val="0"/>
-              </a:spcAft>
-              <a:buClr>
-                <a:schemeClr val="dk1"/>
-              </a:buClr>
-              <a:buSzPct val="46808"/>
-              <a:buFont typeface="Arial"/>
-              <a:buNone/>
-            </a:pPr>
-            <a:r>
-              <a:rPr lang="en-US" sz="2350">
-                <a:solidFill>
-                  <a:srgbClr val="E48312"/>
-                </a:solidFill>
-              </a:rPr>
-              <a:t>5.</a:t>
-            </a:r>
-            <a:r>
-              <a:rPr lang="en-US" sz="2350">
-                <a:solidFill>
-                  <a:schemeClr val="dk1"/>
-                </a:solidFill>
-              </a:rPr>
-              <a:t> look at top 10</a:t>
-            </a:r>
-            <a:endParaRPr sz="2350">
-              <a:solidFill>
-                <a:schemeClr val="dk1"/>
-              </a:solidFill>
-              <a:latin typeface="Courier"/>
-              <a:ea typeface="Courier"/>
-              <a:cs typeface="Courier"/>
-              <a:sym typeface="Courier"/>
-            </a:endParaRPr>
           </a:p>
         </p:txBody>
       </p:sp>
@@ -42614,7 +42437,7 @@
   <p:cSld>
     <p:spTree>
       <p:nvGrpSpPr>
-        <p:cNvPr id="1" name="Shape 423"/>
+        <p:cNvPr id="1" name="Shape 424"/>
         <p:cNvGrpSpPr/>
         <p:nvPr/>
       </p:nvGrpSpPr>
@@ -42628,7 +42451,496 @@
       </p:grpSpPr>
       <p:sp>
         <p:nvSpPr>
-          <p:cNvPr id="424" name="Google Shape;424;g3b2adee5b21_5_12"/>
+          <p:cNvPr id="425" name="Google Shape;425;p29"/>
+          <p:cNvSpPr txBox="1">
+            <a:spLocks noGrp="1"/>
+          </p:cNvSpPr>
+          <p:nvPr>
+            <p:ph type="title"/>
+          </p:nvPr>
+        </p:nvSpPr>
+        <p:spPr>
+          <a:xfrm>
+            <a:off x="822960" y="119702"/>
+            <a:ext cx="7543800" cy="680397"/>
+          </a:xfrm>
+          <a:prstGeom prst="rect">
+            <a:avLst/>
+          </a:prstGeom>
+          <a:noFill/>
+          <a:ln>
+            <a:noFill/>
+          </a:ln>
+        </p:spPr>
+        <p:txBody>
+          <a:bodyPr spcFirstLastPara="1" wrap="square" lIns="91425" tIns="45700" rIns="91425" bIns="45700" anchor="b" anchorCtr="0">
+            <a:normAutofit/>
+          </a:bodyPr>
+          <a:lstStyle/>
+          <a:p>
+            <a:pPr marL="0" lvl="0" indent="0" algn="l" rtl="0">
+              <a:lnSpc>
+                <a:spcPct val="85000"/>
+              </a:lnSpc>
+              <a:spcBef>
+                <a:spcPts val="0"/>
+              </a:spcBef>
+              <a:spcAft>
+                <a:spcPts val="0"/>
+              </a:spcAft>
+              <a:buClr>
+                <a:srgbClr val="3F3F3F"/>
+              </a:buClr>
+              <a:buSzPts val="3600"/>
+              <a:buFont typeface="Calibri"/>
+              <a:buNone/>
+            </a:pPr>
+            <a:r>
+              <a:rPr lang="en-US"/>
+              <a:t>Ex 6 Solutions</a:t>
+            </a:r>
+            <a:endParaRPr/>
+          </a:p>
+        </p:txBody>
+      </p:sp>
+      <p:sp>
+        <p:nvSpPr>
+          <p:cNvPr id="426" name="Google Shape;426;p29"/>
+          <p:cNvSpPr txBox="1">
+            <a:spLocks noGrp="1"/>
+          </p:cNvSpPr>
+          <p:nvPr>
+            <p:ph type="body" idx="1"/>
+          </p:nvPr>
+        </p:nvSpPr>
+        <p:spPr>
+          <a:xfrm>
+            <a:off x="822950" y="800100"/>
+            <a:ext cx="8102700" cy="4112100"/>
+          </a:xfrm>
+          <a:prstGeom prst="rect">
+            <a:avLst/>
+          </a:prstGeom>
+          <a:noFill/>
+          <a:ln>
+            <a:noFill/>
+          </a:ln>
+        </p:spPr>
+        <p:txBody>
+          <a:bodyPr spcFirstLastPara="1" wrap="square" lIns="0" tIns="45700" rIns="0" bIns="45700" anchor="t" anchorCtr="0">
+            <a:normAutofit fontScale="92500" lnSpcReduction="20000"/>
+          </a:bodyPr>
+          <a:lstStyle/>
+          <a:p>
+            <a:pPr marL="7937" lvl="0" indent="-7937" algn="l" rtl="0">
+              <a:lnSpc>
+                <a:spcPct val="90000"/>
+              </a:lnSpc>
+              <a:spcBef>
+                <a:spcPts val="0"/>
+              </a:spcBef>
+              <a:spcAft>
+                <a:spcPts val="0"/>
+              </a:spcAft>
+              <a:buSzPct val="100000"/>
+              <a:buNone/>
+            </a:pPr>
+            <a:r>
+              <a:rPr lang="en-US" sz="2800"/>
+              <a:t>Find the 10 most common bigrams</a:t>
+            </a:r>
+            <a:endParaRPr sz="2800"/>
+          </a:p>
+          <a:p>
+            <a:pPr marL="7938" lvl="0" indent="-7938" algn="l" rtl="0">
+              <a:lnSpc>
+                <a:spcPct val="90000"/>
+              </a:lnSpc>
+              <a:spcBef>
+                <a:spcPts val="0"/>
+              </a:spcBef>
+              <a:spcAft>
+                <a:spcPts val="0"/>
+              </a:spcAft>
+              <a:buSzPct val="100000"/>
+              <a:buNone/>
+            </a:pPr>
+            <a:endParaRPr/>
+          </a:p>
+          <a:p>
+            <a:pPr marL="0" lvl="1" indent="0" algn="l" rtl="0">
+              <a:lnSpc>
+                <a:spcPct val="90000"/>
+              </a:lnSpc>
+              <a:spcBef>
+                <a:spcPts val="300"/>
+              </a:spcBef>
+              <a:spcAft>
+                <a:spcPts val="0"/>
+              </a:spcAft>
+              <a:buSzPct val="100000"/>
+              <a:buNone/>
+            </a:pPr>
+            <a:r>
+              <a:rPr lang="en-US" sz="2400">
+                <a:latin typeface="Courier"/>
+                <a:ea typeface="Courier"/>
+                <a:cs typeface="Courier"/>
+                <a:sym typeface="Courier"/>
+              </a:rPr>
+              <a:t>tr 'A-Z' 'a-z' &lt; nyt.bigrams | sort | uniq -c | sort -nr | head -n 10 </a:t>
+            </a:r>
+            <a:endParaRPr sz="2400">
+              <a:latin typeface="Courier"/>
+              <a:ea typeface="Courier"/>
+              <a:cs typeface="Courier"/>
+              <a:sym typeface="Courier"/>
+            </a:endParaRPr>
+          </a:p>
+          <a:p>
+            <a:pPr marL="0" lvl="0" indent="0" algn="l" rtl="0">
+              <a:spcBef>
+                <a:spcPts val="300"/>
+              </a:spcBef>
+              <a:spcAft>
+                <a:spcPts val="0"/>
+              </a:spcAft>
+              <a:buClr>
+                <a:schemeClr val="dk1"/>
+              </a:buClr>
+              <a:buSzPct val="39285"/>
+              <a:buFont typeface="Arial"/>
+              <a:buNone/>
+            </a:pPr>
+            <a:endParaRPr>
+              <a:solidFill>
+                <a:schemeClr val="dk1"/>
+              </a:solidFill>
+              <a:latin typeface="Courier"/>
+              <a:ea typeface="Courier"/>
+              <a:cs typeface="Courier"/>
+              <a:sym typeface="Courier"/>
+            </a:endParaRPr>
+          </a:p>
+          <a:p>
+            <a:pPr marL="0" lvl="1" indent="0" algn="l" rtl="0">
+              <a:lnSpc>
+                <a:spcPct val="90000"/>
+              </a:lnSpc>
+              <a:spcBef>
+                <a:spcPts val="300"/>
+              </a:spcBef>
+              <a:spcAft>
+                <a:spcPts val="0"/>
+              </a:spcAft>
+              <a:buSzPct val="156468"/>
+              <a:buNone/>
+            </a:pPr>
+            <a:endParaRPr sz="1533">
+              <a:solidFill>
+                <a:schemeClr val="dk1"/>
+              </a:solidFill>
+              <a:latin typeface="Arial"/>
+              <a:ea typeface="Arial"/>
+              <a:cs typeface="Arial"/>
+              <a:sym typeface="Arial"/>
+            </a:endParaRPr>
+          </a:p>
+          <a:p>
+            <a:pPr marL="0" lvl="1" indent="0" algn="l" rtl="0">
+              <a:lnSpc>
+                <a:spcPct val="90000"/>
+              </a:lnSpc>
+              <a:spcBef>
+                <a:spcPts val="300"/>
+              </a:spcBef>
+              <a:spcAft>
+                <a:spcPts val="0"/>
+              </a:spcAft>
+              <a:buSzPct val="117073"/>
+              <a:buNone/>
+            </a:pPr>
+            <a:r>
+              <a:rPr lang="en-US" sz="2049">
+                <a:solidFill>
+                  <a:schemeClr val="dk1"/>
+                </a:solidFill>
+                <a:latin typeface="Courier"/>
+                <a:ea typeface="Courier"/>
+                <a:cs typeface="Courier"/>
+                <a:sym typeface="Courier"/>
+              </a:rPr>
+              <a:t>cat nyt.bigrams | tr "[:upper:]" "[:lower:]" | sort | uniq -c | sort -rn | head -n 10</a:t>
+            </a:r>
+            <a:endParaRPr sz="2049">
+              <a:solidFill>
+                <a:schemeClr val="dk1"/>
+              </a:solidFill>
+              <a:latin typeface="Courier"/>
+              <a:ea typeface="Courier"/>
+              <a:cs typeface="Courier"/>
+              <a:sym typeface="Courier"/>
+            </a:endParaRPr>
+          </a:p>
+          <a:p>
+            <a:pPr marL="0" lvl="1" indent="0" algn="l" rtl="0">
+              <a:lnSpc>
+                <a:spcPct val="90000"/>
+              </a:lnSpc>
+              <a:spcBef>
+                <a:spcPts val="300"/>
+              </a:spcBef>
+              <a:spcAft>
+                <a:spcPts val="0"/>
+              </a:spcAft>
+              <a:buSzPct val="117073"/>
+              <a:buNone/>
+            </a:pPr>
+            <a:endParaRPr sz="2049">
+              <a:solidFill>
+                <a:schemeClr val="dk1"/>
+              </a:solidFill>
+            </a:endParaRPr>
+          </a:p>
+          <a:p>
+            <a:pPr marL="0" lvl="1" indent="0" algn="l" rtl="0">
+              <a:lnSpc>
+                <a:spcPct val="90000"/>
+              </a:lnSpc>
+              <a:spcBef>
+                <a:spcPts val="300"/>
+              </a:spcBef>
+              <a:spcAft>
+                <a:spcPts val="0"/>
+              </a:spcAft>
+              <a:buSzPct val="156468"/>
+              <a:buNone/>
+            </a:pPr>
+            <a:endParaRPr sz="1533">
+              <a:solidFill>
+                <a:schemeClr val="dk1"/>
+              </a:solidFill>
+              <a:latin typeface="Arial"/>
+              <a:ea typeface="Arial"/>
+              <a:cs typeface="Arial"/>
+              <a:sym typeface="Arial"/>
+            </a:endParaRPr>
+          </a:p>
+          <a:p>
+            <a:pPr marL="0" lvl="1" indent="0" algn="l" rtl="0">
+              <a:lnSpc>
+                <a:spcPct val="90000"/>
+              </a:lnSpc>
+              <a:spcBef>
+                <a:spcPts val="300"/>
+              </a:spcBef>
+              <a:spcAft>
+                <a:spcPts val="0"/>
+              </a:spcAft>
+              <a:buSzPct val="102127"/>
+              <a:buNone/>
+            </a:pPr>
+            <a:r>
+              <a:rPr lang="en-US" sz="2350">
+                <a:solidFill>
+                  <a:srgbClr val="E48312"/>
+                </a:solidFill>
+              </a:rPr>
+              <a:t>1.</a:t>
+            </a:r>
+            <a:r>
+              <a:rPr lang="en-US" sz="2350">
+                <a:solidFill>
+                  <a:schemeClr val="dk1"/>
+                </a:solidFill>
+              </a:rPr>
+              <a:t> lowercase bigrams</a:t>
+            </a:r>
+            <a:endParaRPr sz="2350">
+              <a:solidFill>
+                <a:schemeClr val="dk1"/>
+              </a:solidFill>
+            </a:endParaRPr>
+          </a:p>
+          <a:p>
+            <a:pPr marL="0" lvl="1" indent="0" algn="l" rtl="0">
+              <a:lnSpc>
+                <a:spcPct val="90000"/>
+              </a:lnSpc>
+              <a:spcBef>
+                <a:spcPts val="300"/>
+              </a:spcBef>
+              <a:spcAft>
+                <a:spcPts val="0"/>
+              </a:spcAft>
+              <a:buSzPct val="102127"/>
+              <a:buNone/>
+            </a:pPr>
+            <a:r>
+              <a:rPr lang="en-US" sz="2350">
+                <a:solidFill>
+                  <a:srgbClr val="E48312"/>
+                </a:solidFill>
+              </a:rPr>
+              <a:t>2.</a:t>
+            </a:r>
+            <a:r>
+              <a:rPr lang="en-US" sz="2350">
+                <a:solidFill>
+                  <a:schemeClr val="dk1"/>
+                </a:solidFill>
+              </a:rPr>
+              <a:t> sort alphabetically</a:t>
+            </a:r>
+            <a:endParaRPr sz="2350">
+              <a:solidFill>
+                <a:schemeClr val="dk1"/>
+              </a:solidFill>
+            </a:endParaRPr>
+          </a:p>
+          <a:p>
+            <a:pPr marL="0" lvl="1" indent="0" algn="l" rtl="0">
+              <a:lnSpc>
+                <a:spcPct val="90000"/>
+              </a:lnSpc>
+              <a:spcBef>
+                <a:spcPts val="300"/>
+              </a:spcBef>
+              <a:spcAft>
+                <a:spcPts val="0"/>
+              </a:spcAft>
+              <a:buSzPct val="102127"/>
+              <a:buNone/>
+            </a:pPr>
+            <a:r>
+              <a:rPr lang="en-US" sz="2350">
+                <a:solidFill>
+                  <a:srgbClr val="E48312"/>
+                </a:solidFill>
+              </a:rPr>
+              <a:t>3.</a:t>
+            </a:r>
+            <a:r>
+              <a:rPr lang="en-US" sz="2350">
+                <a:solidFill>
+                  <a:schemeClr val="dk1"/>
+                </a:solidFill>
+              </a:rPr>
+              <a:t> count </a:t>
+            </a:r>
+            <a:endParaRPr sz="2350">
+              <a:solidFill>
+                <a:schemeClr val="dk1"/>
+              </a:solidFill>
+            </a:endParaRPr>
+          </a:p>
+          <a:p>
+            <a:pPr marL="0" lvl="1" indent="0" algn="l" rtl="0">
+              <a:lnSpc>
+                <a:spcPct val="90000"/>
+              </a:lnSpc>
+              <a:spcBef>
+                <a:spcPts val="300"/>
+              </a:spcBef>
+              <a:spcAft>
+                <a:spcPts val="0"/>
+              </a:spcAft>
+              <a:buSzPct val="102127"/>
+              <a:buNone/>
+            </a:pPr>
+            <a:r>
+              <a:rPr lang="en-US" sz="2350">
+                <a:solidFill>
+                  <a:srgbClr val="E48312"/>
+                </a:solidFill>
+              </a:rPr>
+              <a:t>4.</a:t>
+            </a:r>
+            <a:r>
+              <a:rPr lang="en-US" sz="2350">
+                <a:solidFill>
+                  <a:schemeClr val="dk1"/>
+                </a:solidFill>
+              </a:rPr>
+              <a:t> sort in descending order by number</a:t>
+            </a:r>
+            <a:endParaRPr sz="2350">
+              <a:solidFill>
+                <a:schemeClr val="dk1"/>
+              </a:solidFill>
+            </a:endParaRPr>
+          </a:p>
+          <a:p>
+            <a:pPr marL="0" lvl="0" indent="0" algn="l" rtl="0">
+              <a:spcBef>
+                <a:spcPts val="300"/>
+              </a:spcBef>
+              <a:spcAft>
+                <a:spcPts val="0"/>
+              </a:spcAft>
+              <a:buClr>
+                <a:schemeClr val="dk1"/>
+              </a:buClr>
+              <a:buSzPct val="46808"/>
+              <a:buFont typeface="Arial"/>
+              <a:buNone/>
+            </a:pPr>
+            <a:r>
+              <a:rPr lang="en-US" sz="2350">
+                <a:solidFill>
+                  <a:srgbClr val="E48312"/>
+                </a:solidFill>
+              </a:rPr>
+              <a:t>5.</a:t>
+            </a:r>
+            <a:r>
+              <a:rPr lang="en-US" sz="2350">
+                <a:solidFill>
+                  <a:schemeClr val="dk1"/>
+                </a:solidFill>
+              </a:rPr>
+              <a:t> look at top 10</a:t>
+            </a:r>
+            <a:endParaRPr sz="2350">
+              <a:solidFill>
+                <a:schemeClr val="dk1"/>
+              </a:solidFill>
+              <a:latin typeface="Courier"/>
+              <a:ea typeface="Courier"/>
+              <a:cs typeface="Courier"/>
+              <a:sym typeface="Courier"/>
+            </a:endParaRPr>
+          </a:p>
+        </p:txBody>
+      </p:sp>
+    </p:spTree>
+  </p:cSld>
+  <p:clrMapOvr>
+    <a:masterClrMapping/>
+  </p:clrMapOvr>
+</p:sld>
+</file>
+
+<file path=ppt/slides/slide31.xml><?xml version="1.0" encoding="utf-8"?>
+<p:sld xmlns:a="http://schemas.openxmlformats.org/drawingml/2006/main" xmlns:r="http://schemas.openxmlformats.org/officeDocument/2006/relationships" xmlns:p="http://schemas.openxmlformats.org/presentationml/2006/main">
+  <p:cSld>
+    <p:spTree>
+      <p:nvGrpSpPr>
+        <p:cNvPr id="1" name="Shape 430"/>
+        <p:cNvGrpSpPr/>
+        <p:nvPr/>
+      </p:nvGrpSpPr>
+      <p:grpSpPr>
+        <a:xfrm>
+          <a:off x="0" y="0"/>
+          <a:ext cx="0" cy="0"/>
+          <a:chOff x="0" y="0"/>
+          <a:chExt cx="0" cy="0"/>
+        </a:xfrm>
+      </p:grpSpPr>
+      <p:sp>
+        <p:nvSpPr>
+          <p:cNvPr id="431" name="Google Shape;431;g3b2adee5b21_5_12"/>
           <p:cNvSpPr txBox="1">
             <a:spLocks noGrp="1"/>
           </p:cNvSpPr>
@@ -42674,7 +42986,7 @@
       </p:sp>
       <p:pic>
         <p:nvPicPr>
-          <p:cNvPr id="425" name="Google Shape;425;g3b2adee5b21_5_12" title="Screenshot 2026-01-06 at 2.19.01 PM.png"/>
+          <p:cNvPr id="432" name="Google Shape;432;g3b2adee5b21_5_12" title="Screenshot 2026-01-06 at 2.19.01 PM.png"/>
           <p:cNvPicPr preferRelativeResize="0"/>
           <p:nvPr/>
         </p:nvPicPr>
@@ -42707,12 +43019,12 @@
 </p:sld>
 </file>
 
-<file path=ppt/slides/slide31.xml><?xml version="1.0" encoding="utf-8"?>
+<file path=ppt/slides/slide32.xml><?xml version="1.0" encoding="utf-8"?>
 <p:sld xmlns:a="http://schemas.openxmlformats.org/drawingml/2006/main" xmlns:r="http://schemas.openxmlformats.org/officeDocument/2006/relationships" xmlns:p="http://schemas.openxmlformats.org/presentationml/2006/main">
   <p:cSld>
     <p:spTree>
       <p:nvGrpSpPr>
-        <p:cNvPr id="1" name="Shape 429"/>
+        <p:cNvPr id="1" name="Shape 436"/>
         <p:cNvGrpSpPr/>
         <p:nvPr/>
       </p:nvGrpSpPr>
@@ -42726,7 +43038,7 @@
       </p:grpSpPr>
       <p:sp>
         <p:nvSpPr>
-          <p:cNvPr id="430" name="Google Shape;430;g3b2adee5b21_3_0"/>
+          <p:cNvPr id="437" name="Google Shape;437;g3b2adee5b21_3_0"/>
           <p:cNvSpPr txBox="1">
             <a:spLocks noGrp="1"/>
           </p:cNvSpPr>
@@ -42780,7 +43092,7 @@
       </p:sp>
       <p:sp>
         <p:nvSpPr>
-          <p:cNvPr id="431" name="Google Shape;431;g3b2adee5b21_3_0"/>
+          <p:cNvPr id="438" name="Google Shape;438;g3b2adee5b21_3_0"/>
           <p:cNvSpPr txBox="1">
             <a:spLocks noGrp="1"/>
           </p:cNvSpPr>
@@ -42976,12 +43288,12 @@
 </p:sld>
 </file>
 
-<file path=ppt/slides/slide32.xml><?xml version="1.0" encoding="utf-8"?>
+<file path=ppt/slides/slide33.xml><?xml version="1.0" encoding="utf-8"?>
 <p:sld xmlns:a="http://schemas.openxmlformats.org/drawingml/2006/main" xmlns:r="http://schemas.openxmlformats.org/officeDocument/2006/relationships" xmlns:p="http://schemas.openxmlformats.org/presentationml/2006/main">
   <p:cSld>
     <p:spTree>
       <p:nvGrpSpPr>
-        <p:cNvPr id="1" name="Shape 435"/>
+        <p:cNvPr id="1" name="Shape 442"/>
         <p:cNvGrpSpPr/>
         <p:nvPr/>
       </p:nvGrpSpPr>
@@ -42995,7 +43307,7 @@
       </p:grpSpPr>
       <p:sp>
         <p:nvSpPr>
-          <p:cNvPr id="436" name="Google Shape;436;g3b2adee5b21_5_1"/>
+          <p:cNvPr id="443" name="Google Shape;443;g3b2adee5b21_5_1"/>
           <p:cNvSpPr txBox="1">
             <a:spLocks noGrp="1"/>
           </p:cNvSpPr>
@@ -43215,7 +43527,7 @@
       </p:sp>
       <p:sp>
         <p:nvSpPr>
-          <p:cNvPr id="437" name="Google Shape;437;g3b2adee5b21_5_1"/>
+          <p:cNvPr id="444" name="Google Shape;444;g3b2adee5b21_5_1"/>
           <p:cNvSpPr txBox="1">
             <a:spLocks noGrp="1"/>
           </p:cNvSpPr>
@@ -43269,7 +43581,7 @@
       </p:sp>
       <p:graphicFrame>
         <p:nvGraphicFramePr>
-          <p:cNvPr id="438" name="Google Shape;438;g3b2adee5b21_5_1"/>
+          <p:cNvPr id="445" name="Google Shape;445;g3b2adee5b21_5_1"/>
           <p:cNvGraphicFramePr/>
           <p:nvPr/>
         </p:nvGraphicFramePr>
@@ -43282,7 +43594,7 @@
             <a:tbl>
               <a:tblPr>
                 <a:noFill/>
-                <a:tableStyleId>{9953E664-E905-4831-A74E-16604088EB0E}</a:tableStyleId>
+                <a:tableStyleId>{555C4CA8-A4FE-48A2-89FC-44E913D66B39}</a:tableStyleId>
               </a:tblPr>
               <a:tblGrid>
                 <a:gridCol w="1552200">
@@ -43325,7 +43637,9 @@
                       <a:endParaRPr b="1"/>
                     </a:p>
                   </a:txBody>
-                  <a:tcPr marL="91425" marR="91425" marT="91425" marB="91425"/>
+                  <a:tcPr marL="91425" marR="91425" marT="91425" marB="91425">
+                    <a:noFill/>
+                  </a:tcPr>
                 </a:tc>
                 <a:tc>
                   <a:txBody>
@@ -43370,7 +43684,9 @@
                       <a:endParaRPr b="1"/>
                     </a:p>
                   </a:txBody>
-                  <a:tcPr marL="91425" marR="91425" marT="91425" marB="91425"/>
+                  <a:tcPr marL="91425" marR="91425" marT="91425" marB="91425">
+                    <a:noFill/>
+                  </a:tcPr>
                 </a:tc>
                 <a:extLst>
                   <a:ext uri="{0D108BD9-81ED-4DB2-BD59-A6C34878D82A}">
@@ -43403,7 +43719,9 @@
                       <a:endParaRPr/>
                     </a:p>
                   </a:txBody>
-                  <a:tcPr marL="91425" marR="91425" marT="91425" marB="91425"/>
+                  <a:tcPr marL="91425" marR="91425" marT="91425" marB="91425">
+                    <a:noFill/>
+                  </a:tcPr>
                 </a:tc>
                 <a:tc>
                   <a:txBody>
@@ -43429,7 +43747,9 @@
                       <a:endParaRPr/>
                     </a:p>
                   </a:txBody>
-                  <a:tcPr marL="91425" marR="91425" marT="91425" marB="91425"/>
+                  <a:tcPr marL="91425" marR="91425" marT="91425" marB="91425">
+                    <a:noFill/>
+                  </a:tcPr>
                 </a:tc>
                 <a:extLst>
                   <a:ext uri="{0D108BD9-81ED-4DB2-BD59-A6C34878D82A}">
@@ -43462,7 +43782,9 @@
                       <a:endParaRPr/>
                     </a:p>
                   </a:txBody>
-                  <a:tcPr marL="91425" marR="91425" marT="91425" marB="91425"/>
+                  <a:tcPr marL="91425" marR="91425" marT="91425" marB="91425">
+                    <a:noFill/>
+                  </a:tcPr>
                 </a:tc>
                 <a:tc>
                   <a:txBody>
@@ -43488,7 +43810,9 @@
                       <a:endParaRPr/>
                     </a:p>
                   </a:txBody>
-                  <a:tcPr marL="91425" marR="91425" marT="91425" marB="91425"/>
+                  <a:tcPr marL="91425" marR="91425" marT="91425" marB="91425">
+                    <a:noFill/>
+                  </a:tcPr>
                 </a:tc>
                 <a:extLst>
                   <a:ext uri="{0D108BD9-81ED-4DB2-BD59-A6C34878D82A}">
@@ -43521,7 +43845,9 @@
                       <a:endParaRPr/>
                     </a:p>
                   </a:txBody>
-                  <a:tcPr marL="91425" marR="91425" marT="91425" marB="91425"/>
+                  <a:tcPr marL="91425" marR="91425" marT="91425" marB="91425">
+                    <a:noFill/>
+                  </a:tcPr>
                 </a:tc>
                 <a:tc>
                   <a:txBody>
@@ -43566,6 +43892,7 @@
                       <a:headEnd type="none" w="sm" len="sm"/>
                       <a:tailEnd type="none" w="sm" len="sm"/>
                     </a:lnB>
+                    <a:noFill/>
                   </a:tcPr>
                 </a:tc>
                 <a:extLst>
@@ -43609,6 +43936,7 @@
                       <a:headEnd type="none" w="sm" len="sm"/>
                       <a:tailEnd type="none" w="sm" len="sm"/>
                     </a:lnR>
+                    <a:noFill/>
                   </a:tcPr>
                 </a:tc>
                 <a:tc>
@@ -43672,6 +44000,7 @@
                       <a:headEnd type="none" w="sm" len="sm"/>
                       <a:tailEnd type="none" w="sm" len="sm"/>
                     </a:lnB>
+                    <a:noFill/>
                   </a:tcPr>
                 </a:tc>
                 <a:extLst>
@@ -43715,6 +44044,7 @@
                       <a:headEnd type="none" w="sm" len="sm"/>
                       <a:tailEnd type="none" w="sm" len="sm"/>
                     </a:lnR>
+                    <a:noFill/>
                   </a:tcPr>
                 </a:tc>
                 <a:tc>
@@ -43782,6 +44112,7 @@
                       <a:headEnd type="none" w="sm" len="sm"/>
                       <a:tailEnd type="none" w="sm" len="sm"/>
                     </a:lnB>
+                    <a:noFill/>
                   </a:tcPr>
                 </a:tc>
                 <a:extLst>
@@ -43825,6 +44156,7 @@
                       <a:headEnd type="none" w="sm" len="sm"/>
                       <a:tailEnd type="none" w="sm" len="sm"/>
                     </a:lnR>
+                    <a:noFill/>
                   </a:tcPr>
                 </a:tc>
                 <a:tc>
@@ -43888,6 +44220,7 @@
                       <a:headEnd type="none" w="sm" len="sm"/>
                       <a:tailEnd type="none" w="sm" len="sm"/>
                     </a:lnB>
+                    <a:noFill/>
                   </a:tcPr>
                 </a:tc>
                 <a:extLst>
@@ -43931,6 +44264,7 @@
                       <a:headEnd type="none" w="sm" len="sm"/>
                       <a:tailEnd type="none" w="sm" len="sm"/>
                     </a:lnR>
+                    <a:noFill/>
                   </a:tcPr>
                 </a:tc>
                 <a:tc>
@@ -43998,6 +44332,7 @@
                       <a:headEnd type="none" w="sm" len="sm"/>
                       <a:tailEnd type="none" w="sm" len="sm"/>
                     </a:lnB>
+                    <a:noFill/>
                   </a:tcPr>
                 </a:tc>
                 <a:extLst>
@@ -44031,7 +44366,9 @@
                       <a:endParaRPr/>
                     </a:p>
                   </a:txBody>
-                  <a:tcPr marL="91425" marR="91425" marT="91425" marB="91425"/>
+                  <a:tcPr marL="91425" marR="91425" marT="91425" marB="91425">
+                    <a:noFill/>
+                  </a:tcPr>
                 </a:tc>
                 <a:tc>
                   <a:txBody>
@@ -44076,6 +44413,7 @@
                       <a:headEnd type="none" w="sm" len="sm"/>
                       <a:tailEnd type="none" w="sm" len="sm"/>
                     </a:lnT>
+                    <a:noFill/>
                   </a:tcPr>
                 </a:tc>
                 <a:extLst>
@@ -44090,7 +44428,7 @@
       </p:graphicFrame>
       <p:pic>
         <p:nvPicPr>
-          <p:cNvPr id="439" name="Google Shape;439;g3b2adee5b21_5_1" title="lagrida_latex_editor.png"/>
+          <p:cNvPr id="446" name="Google Shape;446;g3b2adee5b21_5_1" title="lagrida_latex_editor.png"/>
           <p:cNvPicPr preferRelativeResize="0"/>
           <p:nvPr/>
         </p:nvPicPr>
@@ -44118,7 +44456,7 @@
       </p:pic>
       <p:pic>
         <p:nvPicPr>
-          <p:cNvPr id="440" name="Google Shape;440;g3b2adee5b21_5_1" title="lagrida_latex_editor (1).png"/>
+          <p:cNvPr id="447" name="Google Shape;447;g3b2adee5b21_5_1" title="lagrida_latex_editor (1).png"/>
           <p:cNvPicPr preferRelativeResize="0"/>
           <p:nvPr/>
         </p:nvPicPr>
@@ -44152,12 +44490,12 @@
 </p:sld>
 </file>
 
-<file path=ppt/slides/slide33.xml><?xml version="1.0" encoding="utf-8"?>
+<file path=ppt/slides/slide34.xml><?xml version="1.0" encoding="utf-8"?>
 <p:sld xmlns:a="http://schemas.openxmlformats.org/drawingml/2006/main" xmlns:r="http://schemas.openxmlformats.org/officeDocument/2006/relationships" xmlns:p="http://schemas.openxmlformats.org/presentationml/2006/main">
   <p:cSld>
     <p:spTree>
       <p:nvGrpSpPr>
-        <p:cNvPr id="1" name="Shape 444"/>
+        <p:cNvPr id="1" name="Shape 451"/>
         <p:cNvGrpSpPr/>
         <p:nvPr/>
       </p:nvGrpSpPr>
@@ -44171,7 +44509,7 @@
       </p:grpSpPr>
       <p:sp>
         <p:nvSpPr>
-          <p:cNvPr id="445" name="Google Shape;445;g3b2adee5b21_1_8"/>
+          <p:cNvPr id="452" name="Google Shape;452;g3b2adee5b21_1_8"/>
           <p:cNvSpPr txBox="1">
             <a:spLocks noGrp="1"/>
           </p:cNvSpPr>
@@ -44225,7 +44563,7 @@
       </p:sp>
       <p:sp>
         <p:nvSpPr>
-          <p:cNvPr id="446" name="Google Shape;446;g3b2adee5b21_1_8"/>
+          <p:cNvPr id="453" name="Google Shape;453;g3b2adee5b21_1_8"/>
           <p:cNvSpPr txBox="1">
             <a:spLocks noGrp="1"/>
           </p:cNvSpPr>
@@ -44471,7 +44809,7 @@
       </p:sp>
       <p:sp>
         <p:nvSpPr>
-          <p:cNvPr id="447" name="Google Shape;447;g3b2adee5b21_1_8"/>
+          <p:cNvPr id="454" name="Google Shape;454;g3b2adee5b21_1_8"/>
           <p:cNvSpPr txBox="1">
             <a:spLocks noGrp="1"/>
           </p:cNvSpPr>
@@ -44567,12 +44905,12 @@
 </p:sld>
 </file>
 
-<file path=ppt/slides/slide34.xml><?xml version="1.0" encoding="utf-8"?>
+<file path=ppt/slides/slide35.xml><?xml version="1.0" encoding="utf-8"?>
 <p:sld xmlns:a="http://schemas.openxmlformats.org/drawingml/2006/main" xmlns:r="http://schemas.openxmlformats.org/officeDocument/2006/relationships" xmlns:p="http://schemas.openxmlformats.org/presentationml/2006/main">
   <p:cSld>
     <p:spTree>
       <p:nvGrpSpPr>
-        <p:cNvPr id="1" name="Shape 451"/>
+        <p:cNvPr id="1" name="Shape 468"/>
         <p:cNvGrpSpPr/>
         <p:nvPr/>
       </p:nvGrpSpPr>
@@ -44586,7 +44924,7 @@
       </p:grpSpPr>
       <p:sp>
         <p:nvSpPr>
-          <p:cNvPr id="452" name="Google Shape;452;p30"/>
+          <p:cNvPr id="469" name="Google Shape;469;p30"/>
           <p:cNvSpPr txBox="1">
             <a:spLocks noGrp="1"/>
           </p:cNvSpPr>
@@ -44632,7 +44970,7 @@
       </p:sp>
       <p:sp>
         <p:nvSpPr>
-          <p:cNvPr id="453" name="Google Shape;453;p30"/>
+          <p:cNvPr id="470" name="Google Shape;470;p30"/>
           <p:cNvSpPr txBox="1">
             <a:spLocks noGrp="1"/>
           </p:cNvSpPr>
@@ -44784,12 +45122,12 @@
 </p:sld>
 </file>
 
-<file path=ppt/slides/slide35.xml><?xml version="1.0" encoding="utf-8"?>
+<file path=ppt/slides/slide36.xml><?xml version="1.0" encoding="utf-8"?>
 <p:sld xmlns:a="http://schemas.openxmlformats.org/drawingml/2006/main" xmlns:r="http://schemas.openxmlformats.org/officeDocument/2006/relationships" xmlns:p="http://schemas.openxmlformats.org/presentationml/2006/main">
   <p:cSld>
     <p:spTree>
       <p:nvGrpSpPr>
-        <p:cNvPr id="1" name="Shape 457"/>
+        <p:cNvPr id="1" name="Shape 474"/>
         <p:cNvGrpSpPr/>
         <p:nvPr/>
       </p:nvGrpSpPr>
@@ -44803,7 +45141,7 @@
       </p:grpSpPr>
       <p:sp>
         <p:nvSpPr>
-          <p:cNvPr id="458" name="Google Shape;458;p31"/>
+          <p:cNvPr id="475" name="Google Shape;475;p31"/>
           <p:cNvSpPr txBox="1">
             <a:spLocks noGrp="1"/>
           </p:cNvSpPr>
@@ -44857,7 +45195,7 @@
       </p:sp>
       <p:sp>
         <p:nvSpPr>
-          <p:cNvPr id="459" name="Google Shape;459;p31"/>
+          <p:cNvPr id="476" name="Google Shape;476;p31"/>
           <p:cNvSpPr txBox="1">
             <a:spLocks noGrp="1"/>
           </p:cNvSpPr>
@@ -44949,12 +45287,12 @@
 </p:sld>
 </file>
 
-<file path=ppt/slides/slide36.xml><?xml version="1.0" encoding="utf-8"?>
+<file path=ppt/slides/slide37.xml><?xml version="1.0" encoding="utf-8"?>
 <p:sld xmlns:a="http://schemas.openxmlformats.org/drawingml/2006/main" xmlns:r="http://schemas.openxmlformats.org/officeDocument/2006/relationships" xmlns:p="http://schemas.openxmlformats.org/presentationml/2006/main">
   <p:cSld>
     <p:spTree>
       <p:nvGrpSpPr>
-        <p:cNvPr id="1" name="Shape 463"/>
+        <p:cNvPr id="1" name="Shape 480"/>
         <p:cNvGrpSpPr/>
         <p:nvPr/>
       </p:nvGrpSpPr>
@@ -44968,7 +45306,7 @@
       </p:grpSpPr>
       <p:sp>
         <p:nvSpPr>
-          <p:cNvPr id="464" name="Google Shape;464;p32"/>
+          <p:cNvPr id="481" name="Google Shape;481;p32"/>
           <p:cNvSpPr txBox="1">
             <a:spLocks noGrp="1"/>
           </p:cNvSpPr>
@@ -45022,7 +45360,7 @@
       </p:sp>
       <p:sp>
         <p:nvSpPr>
-          <p:cNvPr id="465" name="Google Shape;465;p32"/>
+          <p:cNvPr id="482" name="Google Shape;482;p32"/>
           <p:cNvSpPr txBox="1">
             <a:spLocks noGrp="1"/>
           </p:cNvSpPr>
@@ -45098,12 +45436,12 @@
 </p:sld>
 </file>
 
-<file path=ppt/slides/slide37.xml><?xml version="1.0" encoding="utf-8"?>
+<file path=ppt/slides/slide38.xml><?xml version="1.0" encoding="utf-8"?>
 <p:sld xmlns:a="http://schemas.openxmlformats.org/drawingml/2006/main" xmlns:r="http://schemas.openxmlformats.org/officeDocument/2006/relationships" xmlns:p="http://schemas.openxmlformats.org/presentationml/2006/main">
   <p:cSld>
     <p:spTree>
       <p:nvGrpSpPr>
-        <p:cNvPr id="1" name="Shape 469"/>
+        <p:cNvPr id="1" name="Shape 486"/>
         <p:cNvGrpSpPr/>
         <p:nvPr/>
       </p:nvGrpSpPr>
@@ -45117,7 +45455,7 @@
       </p:grpSpPr>
       <p:sp>
         <p:nvSpPr>
-          <p:cNvPr id="470" name="Google Shape;470;p33"/>
+          <p:cNvPr id="487" name="Google Shape;487;p33"/>
           <p:cNvSpPr txBox="1">
             <a:spLocks noGrp="1"/>
           </p:cNvSpPr>
@@ -45171,7 +45509,7 @@
       </p:sp>
       <p:sp>
         <p:nvSpPr>
-          <p:cNvPr id="471" name="Google Shape;471;p33"/>
+          <p:cNvPr id="488" name="Google Shape;488;p33"/>
           <p:cNvSpPr txBox="1">
             <a:spLocks noGrp="1"/>
           </p:cNvSpPr>
@@ -46086,52 +46424,6 @@
                 <a:hlinkClick r:id="rId3"/>
               </a:rPr>
               <a:t>http://cs124.stanford.edu/nyt_200811.txt</a:t>
-            </a:r>
-            <a:endParaRPr sz="2600">
-              <a:latin typeface="Courier"/>
-              <a:ea typeface="Courier"/>
-              <a:cs typeface="Courier"/>
-              <a:sym typeface="Courier"/>
-            </a:endParaRPr>
-          </a:p>
-          <a:p>
-            <a:pPr marL="457200" lvl="0" indent="0" algn="l" rtl="0">
-              <a:spcBef>
-                <a:spcPts val="520"/>
-              </a:spcBef>
-              <a:spcAft>
-                <a:spcPts val="0"/>
-              </a:spcAft>
-              <a:buNone/>
-            </a:pPr>
-            <a:r>
-              <a:rPr lang="en-US"/>
-              <a:t>Or run this command:</a:t>
-            </a:r>
-            <a:endParaRPr sz="2200"/>
-          </a:p>
-          <a:p>
-            <a:pPr marL="457200" lvl="0" indent="0" algn="l" rtl="0">
-              <a:spcBef>
-                <a:spcPts val="400"/>
-              </a:spcBef>
-              <a:spcAft>
-                <a:spcPts val="0"/>
-              </a:spcAft>
-              <a:buSzPts val="2000"/>
-              <a:buNone/>
-            </a:pPr>
-            <a:r>
-              <a:rPr lang="en-US" sz="1800">
-                <a:solidFill>
-                  <a:srgbClr val="002DFF"/>
-                </a:solidFill>
-                <a:latin typeface="Courier"/>
-                <a:ea typeface="Courier"/>
-                <a:cs typeface="Courier"/>
-                <a:sym typeface="Courier"/>
-              </a:rPr>
-              <a:t>scp rice:/afs/ir/class/cs124/WWW/nyt_200811.txt  .</a:t>
             </a:r>
             <a:endParaRPr sz="2200"/>
           </a:p>

</xml_diff>